<commit_message>
0.4 - clarification of purpose (neutrality)
</commit_message>
<xml_diff>
--- a/payments/dual-mode-openbanking-api.pptx
+++ b/payments/dual-mode-openbanking-api.pptx
@@ -11,7 +11,6 @@
     <p:sldId id="256" r:id="rId5"/>
     <p:sldId id="257" r:id="rId6"/>
     <p:sldId id="258" r:id="rId7"/>
-    <p:sldId id="259" r:id="rId8"/>
   </p:sldIdLst>
   <p:sldSz cx="9144000" cy="6858000" type="screen4x3"/>
   <p:notesSz cx="6858000" cy="9144000"/>
@@ -173,7 +172,7 @@
                 <a:latin typeface="+mn-lt"/>
                 <a:cs typeface="Arial" panose="020B0604020202020204" pitchFamily="34" charset="0"/>
               </a:rPr>
-              <a:t>/4</a:t>
+              <a:t>/3</a:t>
             </a:r>
             <a:endParaRPr lang="en-US" sz="800" dirty="0">
               <a:latin typeface="+mn-lt"/>
@@ -206,7 +205,7 @@
           <a:p>
             <a:r>
               <a:rPr lang="en-US" sz="800" dirty="0" smtClean="0"/>
-              <a:t>V0.3, </a:t>
+              <a:t>V0.4, </a:t>
             </a:r>
             <a:r>
               <a:rPr lang="en-US" sz="800" dirty="0" err="1" smtClean="0"/>
@@ -214,7 +213,11 @@
             </a:r>
             <a:r>
               <a:rPr lang="en-US" sz="800" dirty="0" smtClean="0"/>
-              <a:t> 2019-10-31</a:t>
+              <a:t> </a:t>
+            </a:r>
+            <a:r>
+              <a:rPr lang="en-US" sz="800" dirty="0" smtClean="0"/>
+              <a:t>2020-04-23</a:t>
             </a:r>
             <a:endParaRPr lang="en-US" sz="800" dirty="0"/>
           </a:p>
@@ -267,7 +270,7 @@
           <a:p>
             <a:fld id="{487FC4E9-77CD-4C2A-BF4D-150A82B34D6E}" type="datetimeFigureOut">
               <a:rPr lang="en-US" smtClean="0"/>
-              <a:t>2019-10-31</a:t>
+              <a:t>2020-04-23</a:t>
             </a:fld>
             <a:endParaRPr lang="en-US"/>
           </a:p>
@@ -544,7 +547,7 @@
           <a:p>
             <a:fld id="{487FC4E9-77CD-4C2A-BF4D-150A82B34D6E}" type="datetimeFigureOut">
               <a:rPr lang="en-US" smtClean="0"/>
-              <a:t>2019-10-31</a:t>
+              <a:t>2020-04-23</a:t>
             </a:fld>
             <a:endParaRPr lang="en-US"/>
           </a:p>
@@ -797,7 +800,7 @@
           <a:p>
             <a:fld id="{487FC4E9-77CD-4C2A-BF4D-150A82B34D6E}" type="datetimeFigureOut">
               <a:rPr lang="en-US" smtClean="0"/>
-              <a:t>2019-10-31</a:t>
+              <a:t>2020-04-23</a:t>
             </a:fld>
             <a:endParaRPr lang="en-US"/>
           </a:p>
@@ -967,7 +970,7 @@
           <a:p>
             <a:fld id="{487FC4E9-77CD-4C2A-BF4D-150A82B34D6E}" type="datetimeFigureOut">
               <a:rPr lang="en-US" smtClean="0"/>
-              <a:t>2019-10-31</a:t>
+              <a:t>2020-04-23</a:t>
             </a:fld>
             <a:endParaRPr lang="en-US"/>
           </a:p>
@@ -1147,7 +1150,7 @@
           <a:p>
             <a:fld id="{487FC4E9-77CD-4C2A-BF4D-150A82B34D6E}" type="datetimeFigureOut">
               <a:rPr lang="en-US" smtClean="0"/>
-              <a:t>2019-10-31</a:t>
+              <a:t>2020-04-23</a:t>
             </a:fld>
             <a:endParaRPr lang="en-US"/>
           </a:p>
@@ -1389,7 +1392,7 @@
           <a:p>
             <a:fld id="{FC49C25B-30EF-47C5-9138-00DBA21FC2D6}" type="datetimeFigureOut">
               <a:rPr lang="en-US" smtClean="0"/>
-              <a:t>2019-10-31</a:t>
+              <a:t>2020-04-23</a:t>
             </a:fld>
             <a:endParaRPr lang="en-US"/>
           </a:p>
@@ -1559,7 +1562,7 @@
           <a:p>
             <a:fld id="{FC49C25B-30EF-47C5-9138-00DBA21FC2D6}" type="datetimeFigureOut">
               <a:rPr lang="en-US" smtClean="0"/>
-              <a:t>2019-10-31</a:t>
+              <a:t>2020-04-23</a:t>
             </a:fld>
             <a:endParaRPr lang="en-US"/>
           </a:p>
@@ -1805,7 +1808,7 @@
           <a:p>
             <a:fld id="{FC49C25B-30EF-47C5-9138-00DBA21FC2D6}" type="datetimeFigureOut">
               <a:rPr lang="en-US" smtClean="0"/>
-              <a:t>2019-10-31</a:t>
+              <a:t>2020-04-23</a:t>
             </a:fld>
             <a:endParaRPr lang="en-US"/>
           </a:p>
@@ -2093,7 +2096,7 @@
           <a:p>
             <a:fld id="{FC49C25B-30EF-47C5-9138-00DBA21FC2D6}" type="datetimeFigureOut">
               <a:rPr lang="en-US" smtClean="0"/>
-              <a:t>2019-10-31</a:t>
+              <a:t>2020-04-23</a:t>
             </a:fld>
             <a:endParaRPr lang="en-US"/>
           </a:p>
@@ -2515,7 +2518,7 @@
           <a:p>
             <a:fld id="{FC49C25B-30EF-47C5-9138-00DBA21FC2D6}" type="datetimeFigureOut">
               <a:rPr lang="en-US" smtClean="0"/>
-              <a:t>2019-10-31</a:t>
+              <a:t>2020-04-23</a:t>
             </a:fld>
             <a:endParaRPr lang="en-US"/>
           </a:p>
@@ -2633,7 +2636,7 @@
           <a:p>
             <a:fld id="{487FC4E9-77CD-4C2A-BF4D-150A82B34D6E}" type="datetimeFigureOut">
               <a:rPr lang="en-US" smtClean="0"/>
-              <a:t>2019-10-31</a:t>
+              <a:t>2020-04-23</a:t>
             </a:fld>
             <a:endParaRPr lang="en-US"/>
           </a:p>
@@ -2751,7 +2754,7 @@
           <a:p>
             <a:fld id="{FC49C25B-30EF-47C5-9138-00DBA21FC2D6}" type="datetimeFigureOut">
               <a:rPr lang="en-US" smtClean="0"/>
-              <a:t>2019-10-31</a:t>
+              <a:t>2020-04-23</a:t>
             </a:fld>
             <a:endParaRPr lang="en-US"/>
           </a:p>
@@ -2846,7 +2849,7 @@
           <a:p>
             <a:fld id="{FC49C25B-30EF-47C5-9138-00DBA21FC2D6}" type="datetimeFigureOut">
               <a:rPr lang="en-US" smtClean="0"/>
-              <a:t>2019-10-31</a:t>
+              <a:t>2020-04-23</a:t>
             </a:fld>
             <a:endParaRPr lang="en-US"/>
           </a:p>
@@ -3123,7 +3126,7 @@
           <a:p>
             <a:fld id="{FC49C25B-30EF-47C5-9138-00DBA21FC2D6}" type="datetimeFigureOut">
               <a:rPr lang="en-US" smtClean="0"/>
-              <a:t>2019-10-31</a:t>
+              <a:t>2020-04-23</a:t>
             </a:fld>
             <a:endParaRPr lang="en-US"/>
           </a:p>
@@ -3376,7 +3379,7 @@
           <a:p>
             <a:fld id="{FC49C25B-30EF-47C5-9138-00DBA21FC2D6}" type="datetimeFigureOut">
               <a:rPr lang="en-US" smtClean="0"/>
-              <a:t>2019-10-31</a:t>
+              <a:t>2020-04-23</a:t>
             </a:fld>
             <a:endParaRPr lang="en-US"/>
           </a:p>
@@ -3546,7 +3549,7 @@
           <a:p>
             <a:fld id="{FC49C25B-30EF-47C5-9138-00DBA21FC2D6}" type="datetimeFigureOut">
               <a:rPr lang="en-US" smtClean="0"/>
-              <a:t>2019-10-31</a:t>
+              <a:t>2020-04-23</a:t>
             </a:fld>
             <a:endParaRPr lang="en-US"/>
           </a:p>
@@ -3726,7 +3729,7 @@
           <a:p>
             <a:fld id="{FC49C25B-30EF-47C5-9138-00DBA21FC2D6}" type="datetimeFigureOut">
               <a:rPr lang="en-US" smtClean="0"/>
-              <a:t>2019-10-31</a:t>
+              <a:t>2020-04-23</a:t>
             </a:fld>
             <a:endParaRPr lang="en-US"/>
           </a:p>
@@ -3974,7 +3977,7 @@
           <a:p>
             <a:fld id="{9AC59E2D-BDB3-457B-9981-CCAC3BF92E36}" type="datetimeFigureOut">
               <a:rPr lang="en-US" smtClean="0"/>
-              <a:t>2019-10-31</a:t>
+              <a:t>2020-04-23</a:t>
             </a:fld>
             <a:endParaRPr lang="en-US"/>
           </a:p>
@@ -4160,7 +4163,7 @@
           <a:p>
             <a:fld id="{9AC59E2D-BDB3-457B-9981-CCAC3BF92E36}" type="datetimeFigureOut">
               <a:rPr lang="en-US" smtClean="0"/>
-              <a:t>2019-10-31</a:t>
+              <a:t>2020-04-23</a:t>
             </a:fld>
             <a:endParaRPr lang="en-US"/>
           </a:p>
@@ -4412,7 +4415,7 @@
           <a:p>
             <a:fld id="{9AC59E2D-BDB3-457B-9981-CCAC3BF92E36}" type="datetimeFigureOut">
               <a:rPr lang="en-US" smtClean="0"/>
-              <a:t>2019-10-31</a:t>
+              <a:t>2020-04-23</a:t>
             </a:fld>
             <a:endParaRPr lang="en-US"/>
           </a:p>
@@ -4714,7 +4717,7 @@
           <a:p>
             <a:fld id="{9AC59E2D-BDB3-457B-9981-CCAC3BF92E36}" type="datetimeFigureOut">
               <a:rPr lang="en-US" smtClean="0"/>
-              <a:t>2019-10-31</a:t>
+              <a:t>2020-04-23</a:t>
             </a:fld>
             <a:endParaRPr lang="en-US"/>
           </a:p>
@@ -4832,7 +4835,7 @@
           <a:p>
             <a:fld id="{487FC4E9-77CD-4C2A-BF4D-150A82B34D6E}" type="datetimeFigureOut">
               <a:rPr lang="en-US" smtClean="0"/>
-              <a:t>2019-10-31</a:t>
+              <a:t>2020-04-23</a:t>
             </a:fld>
             <a:endParaRPr lang="en-US"/>
           </a:p>
@@ -5274,7 +5277,7 @@
           <a:p>
             <a:fld id="{9AC59E2D-BDB3-457B-9981-CCAC3BF92E36}" type="datetimeFigureOut">
               <a:rPr lang="en-US" smtClean="0"/>
-              <a:t>2019-10-31</a:t>
+              <a:t>2020-04-23</a:t>
             </a:fld>
             <a:endParaRPr lang="en-US"/>
           </a:p>
@@ -5400,7 +5403,7 @@
           <a:p>
             <a:fld id="{9AC59E2D-BDB3-457B-9981-CCAC3BF92E36}" type="datetimeFigureOut">
               <a:rPr lang="en-US" smtClean="0"/>
-              <a:t>2019-10-31</a:t>
+              <a:t>2020-04-23</a:t>
             </a:fld>
             <a:endParaRPr lang="en-US"/>
           </a:p>
@@ -5495,7 +5498,7 @@
           <a:p>
             <a:fld id="{9AC59E2D-BDB3-457B-9981-CCAC3BF92E36}" type="datetimeFigureOut">
               <a:rPr lang="en-US" smtClean="0"/>
-              <a:t>2019-10-31</a:t>
+              <a:t>2020-04-23</a:t>
             </a:fld>
             <a:endParaRPr lang="en-US"/>
           </a:p>
@@ -5781,7 +5784,7 @@
           <a:p>
             <a:fld id="{9AC59E2D-BDB3-457B-9981-CCAC3BF92E36}" type="datetimeFigureOut">
               <a:rPr lang="en-US" smtClean="0"/>
-              <a:t>2019-10-31</a:t>
+              <a:t>2020-04-23</a:t>
             </a:fld>
             <a:endParaRPr lang="en-US"/>
           </a:p>
@@ -6043,7 +6046,7 @@
           <a:p>
             <a:fld id="{9AC59E2D-BDB3-457B-9981-CCAC3BF92E36}" type="datetimeFigureOut">
               <a:rPr lang="en-US" smtClean="0"/>
-              <a:t>2019-10-31</a:t>
+              <a:t>2020-04-23</a:t>
             </a:fld>
             <a:endParaRPr lang="en-US"/>
           </a:p>
@@ -6229,7 +6232,7 @@
           <a:p>
             <a:fld id="{9AC59E2D-BDB3-457B-9981-CCAC3BF92E36}" type="datetimeFigureOut">
               <a:rPr lang="en-US" smtClean="0"/>
-              <a:t>2019-10-31</a:t>
+              <a:t>2020-04-23</a:t>
             </a:fld>
             <a:endParaRPr lang="en-US"/>
           </a:p>
@@ -6415,7 +6418,7 @@
           <a:p>
             <a:fld id="{9AC59E2D-BDB3-457B-9981-CCAC3BF92E36}" type="datetimeFigureOut">
               <a:rPr lang="en-US" smtClean="0"/>
-              <a:t>2019-10-31</a:t>
+              <a:t>2020-04-23</a:t>
             </a:fld>
             <a:endParaRPr lang="en-US"/>
           </a:p>
@@ -6657,7 +6660,7 @@
           <a:p>
             <a:fld id="{FA70D030-0E6B-41F6-8C32-589A7A1D0D79}" type="datetimeFigureOut">
               <a:rPr lang="en-US" smtClean="0"/>
-              <a:t>2019-10-31</a:t>
+              <a:t>2020-04-23</a:t>
             </a:fld>
             <a:endParaRPr lang="en-US"/>
           </a:p>
@@ -6827,7 +6830,7 @@
           <a:p>
             <a:fld id="{FA70D030-0E6B-41F6-8C32-589A7A1D0D79}" type="datetimeFigureOut">
               <a:rPr lang="en-US" smtClean="0"/>
-              <a:t>2019-10-31</a:t>
+              <a:t>2020-04-23</a:t>
             </a:fld>
             <a:endParaRPr lang="en-US"/>
           </a:p>
@@ -7073,7 +7076,7 @@
           <a:p>
             <a:fld id="{FA70D030-0E6B-41F6-8C32-589A7A1D0D79}" type="datetimeFigureOut">
               <a:rPr lang="en-US" smtClean="0"/>
-              <a:t>2019-10-31</a:t>
+              <a:t>2020-04-23</a:t>
             </a:fld>
             <a:endParaRPr lang="en-US"/>
           </a:p>
@@ -7191,7 +7194,7 @@
           <a:p>
             <a:fld id="{487FC4E9-77CD-4C2A-BF4D-150A82B34D6E}" type="datetimeFigureOut">
               <a:rPr lang="en-US" smtClean="0"/>
-              <a:t>2019-10-31</a:t>
+              <a:t>2020-04-23</a:t>
             </a:fld>
             <a:endParaRPr lang="en-US"/>
           </a:p>
@@ -7479,7 +7482,7 @@
           <a:p>
             <a:fld id="{FA70D030-0E6B-41F6-8C32-589A7A1D0D79}" type="datetimeFigureOut">
               <a:rPr lang="en-US" smtClean="0"/>
-              <a:t>2019-10-31</a:t>
+              <a:t>2020-04-23</a:t>
             </a:fld>
             <a:endParaRPr lang="en-US"/>
           </a:p>
@@ -7901,7 +7904,7 @@
           <a:p>
             <a:fld id="{FA70D030-0E6B-41F6-8C32-589A7A1D0D79}" type="datetimeFigureOut">
               <a:rPr lang="en-US" smtClean="0"/>
-              <a:t>2019-10-31</a:t>
+              <a:t>2020-04-23</a:t>
             </a:fld>
             <a:endParaRPr lang="en-US"/>
           </a:p>
@@ -8019,7 +8022,7 @@
           <a:p>
             <a:fld id="{FA70D030-0E6B-41F6-8C32-589A7A1D0D79}" type="datetimeFigureOut">
               <a:rPr lang="en-US" smtClean="0"/>
-              <a:t>2019-10-31</a:t>
+              <a:t>2020-04-23</a:t>
             </a:fld>
             <a:endParaRPr lang="en-US"/>
           </a:p>
@@ -8114,7 +8117,7 @@
           <a:p>
             <a:fld id="{FA70D030-0E6B-41F6-8C32-589A7A1D0D79}" type="datetimeFigureOut">
               <a:rPr lang="en-US" smtClean="0"/>
-              <a:t>2019-10-31</a:t>
+              <a:t>2020-04-23</a:t>
             </a:fld>
             <a:endParaRPr lang="en-US"/>
           </a:p>
@@ -8391,7 +8394,7 @@
           <a:p>
             <a:fld id="{FA70D030-0E6B-41F6-8C32-589A7A1D0D79}" type="datetimeFigureOut">
               <a:rPr lang="en-US" smtClean="0"/>
-              <a:t>2019-10-31</a:t>
+              <a:t>2020-04-23</a:t>
             </a:fld>
             <a:endParaRPr lang="en-US"/>
           </a:p>
@@ -8644,7 +8647,7 @@
           <a:p>
             <a:fld id="{FA70D030-0E6B-41F6-8C32-589A7A1D0D79}" type="datetimeFigureOut">
               <a:rPr lang="en-US" smtClean="0"/>
-              <a:t>2019-10-31</a:t>
+              <a:t>2020-04-23</a:t>
             </a:fld>
             <a:endParaRPr lang="en-US"/>
           </a:p>
@@ -8814,7 +8817,7 @@
           <a:p>
             <a:fld id="{FA70D030-0E6B-41F6-8C32-589A7A1D0D79}" type="datetimeFigureOut">
               <a:rPr lang="en-US" smtClean="0"/>
-              <a:t>2019-10-31</a:t>
+              <a:t>2020-04-23</a:t>
             </a:fld>
             <a:endParaRPr lang="en-US"/>
           </a:p>
@@ -8994,7 +8997,7 @@
           <a:p>
             <a:fld id="{FA70D030-0E6B-41F6-8C32-589A7A1D0D79}" type="datetimeFigureOut">
               <a:rPr lang="en-US" smtClean="0"/>
-              <a:t>2019-10-31</a:t>
+              <a:t>2020-04-23</a:t>
             </a:fld>
             <a:endParaRPr lang="en-US"/>
           </a:p>
@@ -9164,7 +9167,7 @@
           <a:p>
             <a:fld id="{487FC4E9-77CD-4C2A-BF4D-150A82B34D6E}" type="datetimeFigureOut">
               <a:rPr lang="en-US" smtClean="0"/>
-              <a:t>2019-10-31</a:t>
+              <a:t>2020-04-23</a:t>
             </a:fld>
             <a:endParaRPr lang="en-US"/>
           </a:p>
@@ -9410,7 +9413,7 @@
           <a:p>
             <a:fld id="{487FC4E9-77CD-4C2A-BF4D-150A82B34D6E}" type="datetimeFigureOut">
               <a:rPr lang="en-US" smtClean="0"/>
-              <a:t>2019-10-31</a:t>
+              <a:t>2020-04-23</a:t>
             </a:fld>
             <a:endParaRPr lang="en-US"/>
           </a:p>
@@ -9698,7 +9701,7 @@
           <a:p>
             <a:fld id="{487FC4E9-77CD-4C2A-BF4D-150A82B34D6E}" type="datetimeFigureOut">
               <a:rPr lang="en-US" smtClean="0"/>
-              <a:t>2019-10-31</a:t>
+              <a:t>2020-04-23</a:t>
             </a:fld>
             <a:endParaRPr lang="en-US"/>
           </a:p>
@@ -10120,7 +10123,7 @@
           <a:p>
             <a:fld id="{487FC4E9-77CD-4C2A-BF4D-150A82B34D6E}" type="datetimeFigureOut">
               <a:rPr lang="en-US" smtClean="0"/>
-              <a:t>2019-10-31</a:t>
+              <a:t>2020-04-23</a:t>
             </a:fld>
             <a:endParaRPr lang="en-US"/>
           </a:p>
@@ -10238,7 +10241,7 @@
           <a:p>
             <a:fld id="{487FC4E9-77CD-4C2A-BF4D-150A82B34D6E}" type="datetimeFigureOut">
               <a:rPr lang="en-US" smtClean="0"/>
-              <a:t>2019-10-31</a:t>
+              <a:t>2020-04-23</a:t>
             </a:fld>
             <a:endParaRPr lang="en-US"/>
           </a:p>
@@ -10451,7 +10454,7 @@
           <a:p>
             <a:fld id="{487FC4E9-77CD-4C2A-BF4D-150A82B34D6E}" type="datetimeFigureOut">
               <a:rPr lang="en-US" smtClean="0"/>
-              <a:t>2019-10-31</a:t>
+              <a:t>2020-04-23</a:t>
             </a:fld>
             <a:endParaRPr lang="en-US"/>
           </a:p>
@@ -10964,7 +10967,7 @@
           <a:p>
             <a:fld id="{FC49C25B-30EF-47C5-9138-00DBA21FC2D6}" type="datetimeFigureOut">
               <a:rPr lang="en-US" smtClean="0"/>
-              <a:t>2019-10-31</a:t>
+              <a:t>2020-04-23</a:t>
             </a:fld>
             <a:endParaRPr lang="en-US"/>
           </a:p>
@@ -11379,7 +11382,7 @@
           <a:p>
             <a:fld id="{9AC59E2D-BDB3-457B-9981-CCAC3BF92E36}" type="datetimeFigureOut">
               <a:rPr lang="en-US" smtClean="0"/>
-              <a:t>2019-10-31</a:t>
+              <a:t>2020-04-23</a:t>
             </a:fld>
             <a:endParaRPr lang="en-US"/>
           </a:p>
@@ -11889,7 +11892,7 @@
           <a:p>
             <a:fld id="{FA70D030-0E6B-41F6-8C32-589A7A1D0D79}" type="datetimeFigureOut">
               <a:rPr lang="en-US" smtClean="0"/>
-              <a:t>2019-10-31</a:t>
+              <a:t>2020-04-23</a:t>
             </a:fld>
             <a:endParaRPr lang="en-US"/>
           </a:p>
@@ -12277,7 +12280,7 @@
         </p:nvSpPr>
         <p:spPr>
           <a:xfrm>
-            <a:off x="5040287" y="1013509"/>
+            <a:off x="5040287" y="869493"/>
             <a:ext cx="3564161" cy="2847539"/>
           </a:xfrm>
           <a:prstGeom prst="roundRect">
@@ -12323,7 +12326,7 @@
         </p:nvCxnSpPr>
         <p:spPr>
           <a:xfrm>
-            <a:off x="1592370" y="3273260"/>
+            <a:off x="1592370" y="3129244"/>
             <a:ext cx="3672000" cy="1030"/>
           </a:xfrm>
           <a:prstGeom prst="straightConnector1">
@@ -12359,7 +12362,7 @@
         </p:nvSpPr>
         <p:spPr>
           <a:xfrm>
-            <a:off x="6464389" y="1568289"/>
+            <a:off x="6464389" y="1424273"/>
             <a:ext cx="169602" cy="414000"/>
           </a:xfrm>
           <a:prstGeom prst="arc">
@@ -12400,7 +12403,7 @@
         </p:nvSpPr>
         <p:spPr>
           <a:xfrm>
-            <a:off x="2275561" y="1586543"/>
+            <a:off x="2275561" y="1442527"/>
             <a:ext cx="4752000" cy="167605"/>
           </a:xfrm>
           <a:prstGeom prst="rightArrow">
@@ -12454,7 +12457,7 @@
         </p:nvSpPr>
         <p:spPr>
           <a:xfrm>
-            <a:off x="5909148" y="1789490"/>
+            <a:off x="5909148" y="1645474"/>
             <a:ext cx="1116956" cy="1312971"/>
           </a:xfrm>
           <a:prstGeom prst="bentArrow">
@@ -12524,7 +12527,7 @@
         </p:blipFill>
         <p:spPr>
           <a:xfrm>
-            <a:off x="6948264" y="1208156"/>
+            <a:off x="6948264" y="1064140"/>
             <a:ext cx="1512168" cy="1120124"/>
           </a:xfrm>
           <a:prstGeom prst="rect">
@@ -12547,7 +12550,7 @@
         </p:nvSpPr>
         <p:spPr>
           <a:xfrm>
-            <a:off x="5306433" y="2852936"/>
+            <a:off x="5306433" y="2708920"/>
             <a:ext cx="1296144" cy="847477"/>
           </a:xfrm>
           <a:prstGeom prst="ellipse">
@@ -12635,7 +12638,7 @@
         </p:nvSpPr>
         <p:spPr>
           <a:xfrm>
-            <a:off x="380193" y="836712"/>
+            <a:off x="380193" y="692696"/>
             <a:ext cx="1969322" cy="369332"/>
           </a:xfrm>
           <a:prstGeom prst="rect">
@@ -12666,7 +12669,7 @@
         </p:nvSpPr>
         <p:spPr>
           <a:xfrm>
-            <a:off x="323528" y="2417138"/>
+            <a:off x="323528" y="2273122"/>
             <a:ext cx="2106539" cy="369332"/>
           </a:xfrm>
           <a:prstGeom prst="rect">
@@ -12697,7 +12700,7 @@
         </p:nvSpPr>
         <p:spPr>
           <a:xfrm>
-            <a:off x="7346284" y="2155984"/>
+            <a:off x="7346284" y="2011968"/>
             <a:ext cx="646331" cy="369332"/>
           </a:xfrm>
           <a:prstGeom prst="rect">
@@ -12727,7 +12730,7 @@
         </p:nvSpPr>
         <p:spPr>
           <a:xfrm>
-            <a:off x="428750" y="1210163"/>
+            <a:off x="428750" y="1066147"/>
             <a:ext cx="1872208" cy="936104"/>
           </a:xfrm>
           <a:prstGeom prst="roundRect">
@@ -12805,7 +12808,7 @@
         </p:blipFill>
         <p:spPr bwMode="auto">
           <a:xfrm>
-            <a:off x="2084934" y="1932164"/>
+            <a:off x="2084934" y="1788148"/>
             <a:ext cx="324060" cy="394523"/>
           </a:xfrm>
           <a:prstGeom prst="rect">
@@ -12831,7 +12834,7 @@
         </p:nvSpPr>
         <p:spPr>
           <a:xfrm>
-            <a:off x="5272303" y="1177638"/>
+            <a:off x="5272303" y="1033622"/>
             <a:ext cx="1667444" cy="338554"/>
           </a:xfrm>
           <a:prstGeom prst="rect">
@@ -12883,7 +12886,7 @@
         </p:blipFill>
         <p:spPr bwMode="auto">
           <a:xfrm flipV="1">
-            <a:off x="5436096" y="3113413"/>
+            <a:off x="5436096" y="2969397"/>
             <a:ext cx="434272" cy="434272"/>
           </a:xfrm>
           <a:prstGeom prst="rect">
@@ -12910,7 +12913,7 @@
         </p:nvSpPr>
         <p:spPr>
           <a:xfrm>
-            <a:off x="6633991" y="2828407"/>
+            <a:off x="6633991" y="2684391"/>
             <a:ext cx="1573701" cy="584775"/>
           </a:xfrm>
           <a:prstGeom prst="rect">
@@ -12947,7 +12950,7 @@
         </p:nvCxnSpPr>
         <p:spPr>
           <a:xfrm>
-            <a:off x="6553646" y="1515534"/>
+            <a:off x="6553646" y="1371518"/>
             <a:ext cx="0" cy="50400"/>
           </a:xfrm>
           <a:prstGeom prst="line">
@@ -12984,7 +12987,7 @@
         </p:nvSpPr>
         <p:spPr bwMode="auto">
           <a:xfrm>
-            <a:off x="5954505" y="3030967"/>
+            <a:off x="5954505" y="2886951"/>
             <a:ext cx="420579" cy="299834"/>
           </a:xfrm>
           <a:prstGeom prst="can">
@@ -13039,7 +13042,7 @@
         </p:nvSpPr>
         <p:spPr>
           <a:xfrm flipH="1">
-            <a:off x="6465336" y="1568289"/>
+            <a:off x="6465336" y="1424273"/>
             <a:ext cx="169602" cy="414000"/>
           </a:xfrm>
           <a:prstGeom prst="arc">
@@ -13080,7 +13083,7 @@
         </p:nvSpPr>
         <p:spPr>
           <a:xfrm>
-            <a:off x="971600" y="188640"/>
+            <a:off x="971600" y="116632"/>
             <a:ext cx="7267374" cy="461665"/>
           </a:xfrm>
           <a:prstGeom prst="rect">
@@ -13116,7 +13119,7 @@
         </p:nvSpPr>
         <p:spPr>
           <a:xfrm>
-            <a:off x="323528" y="4149080"/>
+            <a:off x="323528" y="3861048"/>
             <a:ext cx="8496944" cy="2354491"/>
           </a:xfrm>
           <a:prstGeom prst="rect">
@@ -13217,15 +13220,7 @@
             </a:r>
             <a:r>
               <a:rPr lang="en-US" sz="1200" dirty="0" smtClean="0"/>
-              <a:t>, the API does not expose (or depend on) personal information to external parties, </a:t>
-            </a:r>
-            <a:r>
-              <a:rPr lang="en-US" sz="1200" dirty="0" smtClean="0"/>
-              <a:t>effectively removing </a:t>
-            </a:r>
-            <a:r>
-              <a:rPr lang="en-US" sz="1200" dirty="0" smtClean="0"/>
-              <a:t>“consents” from the plot. This arrangement also enables a (with respect to the user), </a:t>
+              <a:t>, the API does not expose (or depend on) personal information to external parties, effectively removing “consents” from the plot. This arrangement also enables a (with respect to the user), </a:t>
             </a:r>
             <a:r>
               <a:rPr lang="en-US" sz="1200" i="1" dirty="0" smtClean="0"/>
@@ -13288,9 +13283,12 @@
             </a:r>
             <a:r>
               <a:rPr lang="en-US" sz="1200" dirty="0" smtClean="0"/>
-              <a:t>.  User login is though required during virtual card enrollment.  This is preferably accomplished through the bank’s regular on-line login.</a:t>
-            </a:r>
-            <a:endParaRPr lang="en-US" sz="1200" dirty="0"/>
+              <a:t>.  User login is though required during virtual card enrollment.  This is preferably accomplished through the bank’s regular on-line login</a:t>
+            </a:r>
+            <a:r>
+              <a:rPr lang="en-US" sz="1200" dirty="0" smtClean="0"/>
+              <a:t>.</a:t>
+            </a:r>
           </a:p>
         </p:txBody>
       </p:sp>
@@ -13302,7 +13300,7 @@
         </p:nvSpPr>
         <p:spPr>
           <a:xfrm>
-            <a:off x="2392721" y="1999873"/>
+            <a:off x="2392721" y="1855857"/>
             <a:ext cx="1096134" cy="276999"/>
           </a:xfrm>
           <a:prstGeom prst="rect">
@@ -13332,7 +13330,7 @@
         </p:nvSpPr>
         <p:spPr>
           <a:xfrm>
-            <a:off x="6698362" y="3440033"/>
+            <a:off x="6698362" y="3296017"/>
             <a:ext cx="1786708" cy="276999"/>
           </a:xfrm>
           <a:prstGeom prst="rect">
@@ -13362,7 +13360,7 @@
         </p:nvSpPr>
         <p:spPr>
           <a:xfrm>
-            <a:off x="2904732" y="1279585"/>
+            <a:off x="2904732" y="1135569"/>
             <a:ext cx="510438" cy="266432"/>
           </a:xfrm>
           <a:prstGeom prst="roundRect">
@@ -13415,7 +13413,7 @@
         </p:nvSpPr>
         <p:spPr>
           <a:xfrm>
-            <a:off x="3690438" y="1279585"/>
+            <a:off x="3690438" y="1135569"/>
             <a:ext cx="798470" cy="266432"/>
           </a:xfrm>
           <a:prstGeom prst="roundRect">
@@ -13468,7 +13466,7 @@
         </p:nvSpPr>
         <p:spPr>
           <a:xfrm>
-            <a:off x="3420820" y="1274302"/>
+            <a:off x="3420820" y="1130286"/>
             <a:ext cx="261610" cy="276999"/>
           </a:xfrm>
           <a:prstGeom prst="rect">
@@ -13499,7 +13497,7 @@
         </p:nvSpPr>
         <p:spPr>
           <a:xfrm>
-            <a:off x="5277425" y="2292541"/>
+            <a:off x="5277425" y="2148525"/>
             <a:ext cx="1351046" cy="244530"/>
           </a:xfrm>
           <a:prstGeom prst="roundRect">
@@ -13538,7 +13536,7 @@
         </p:nvSpPr>
         <p:spPr>
           <a:xfrm>
-            <a:off x="428750" y="2786470"/>
+            <a:off x="428750" y="2642454"/>
             <a:ext cx="1872208" cy="936104"/>
           </a:xfrm>
           <a:prstGeom prst="roundRect">
@@ -13603,7 +13601,7 @@
         </p:blipFill>
         <p:spPr>
           <a:xfrm>
-            <a:off x="883868" y="2886422"/>
+            <a:off x="883868" y="2742406"/>
             <a:ext cx="915020" cy="314830"/>
           </a:xfrm>
           <a:prstGeom prst="rect">
@@ -13619,7 +13617,7 @@
         </p:nvSpPr>
         <p:spPr>
           <a:xfrm>
-            <a:off x="2627784" y="2827670"/>
+            <a:off x="2627784" y="2683654"/>
             <a:ext cx="2122761" cy="338554"/>
           </a:xfrm>
           <a:prstGeom prst="rect">
@@ -13656,7 +13654,7 @@
         </p:nvSpPr>
         <p:spPr>
           <a:xfrm>
-            <a:off x="533713" y="3170364"/>
+            <a:off x="533713" y="3026348"/>
             <a:ext cx="1686166" cy="523220"/>
           </a:xfrm>
           <a:prstGeom prst="rect">
@@ -13718,7 +13716,7 @@
         </p:blipFill>
         <p:spPr bwMode="auto">
           <a:xfrm>
-            <a:off x="1724894" y="1977813"/>
+            <a:off x="1724894" y="1833797"/>
             <a:ext cx="360040" cy="356341"/>
           </a:xfrm>
           <a:prstGeom prst="rect">
@@ -13781,7 +13779,7 @@
         </p:blipFill>
         <p:spPr bwMode="auto">
           <a:xfrm>
-            <a:off x="6032630" y="3455820"/>
+            <a:off x="6032630" y="3311804"/>
             <a:ext cx="360040" cy="356341"/>
           </a:xfrm>
           <a:prstGeom prst="rect">
@@ -13820,7 +13818,7 @@
         </p:nvSpPr>
         <p:spPr>
           <a:xfrm>
-            <a:off x="6418914" y="3401847"/>
+            <a:off x="6418914" y="3257831"/>
             <a:ext cx="216024" cy="61124"/>
           </a:xfrm>
           <a:prstGeom prst="rect">
@@ -13881,7 +13879,7 @@
         </p:blipFill>
         <p:spPr bwMode="auto">
           <a:xfrm>
-            <a:off x="6390575" y="3394517"/>
+            <a:off x="6390575" y="3250501"/>
             <a:ext cx="324060" cy="394523"/>
           </a:xfrm>
           <a:prstGeom prst="rect">
@@ -13907,7 +13905,7 @@
         </p:nvCxnSpPr>
         <p:spPr>
           <a:xfrm>
-            <a:off x="5292329" y="2307431"/>
+            <a:off x="5292329" y="2163415"/>
             <a:ext cx="1322784" cy="209550"/>
           </a:xfrm>
           <a:prstGeom prst="line">
@@ -13942,7 +13940,7 @@
         </p:nvCxnSpPr>
         <p:spPr>
           <a:xfrm flipV="1">
-            <a:off x="5297091" y="2309813"/>
+            <a:off x="5297091" y="2165797"/>
             <a:ext cx="1315640" cy="213123"/>
           </a:xfrm>
           <a:prstGeom prst="line">
@@ -13969,6 +13967,84 @@
           </a:fontRef>
         </p:style>
       </p:cxnSp>
+      <p:sp>
+        <p:nvSpPr>
+          <p:cNvPr id="7" name="TextBox 6"/>
+          <p:cNvSpPr txBox="1"/>
+          <p:nvPr/>
+        </p:nvSpPr>
+        <p:spPr>
+          <a:xfrm>
+            <a:off x="265938" y="6309320"/>
+            <a:ext cx="8570872" cy="306467"/>
+          </a:xfrm>
+          <a:prstGeom prst="roundRect">
+            <a:avLst/>
+          </a:prstGeom>
+          <a:solidFill>
+            <a:schemeClr val="accent3">
+              <a:lumMod val="20000"/>
+              <a:lumOff val="80000"/>
+            </a:schemeClr>
+          </a:solidFill>
+          <a:ln>
+            <a:solidFill>
+              <a:schemeClr val="accent3">
+                <a:lumMod val="75000"/>
+              </a:schemeClr>
+            </a:solidFill>
+          </a:ln>
+          <a:effectLst>
+            <a:outerShdw blurRad="50800" dist="38100" dir="2700000" algn="tl" rotWithShape="0">
+              <a:prstClr val="black">
+                <a:alpha val="40000"/>
+              </a:prstClr>
+            </a:outerShdw>
+          </a:effectLst>
+        </p:spPr>
+        <p:txBody>
+          <a:bodyPr wrap="none" rtlCol="0">
+            <a:spAutoFit/>
+          </a:bodyPr>
+          <a:lstStyle/>
+          <a:p>
+            <a:pPr algn="ctr"/>
+            <a:r>
+              <a:rPr lang="en-US" sz="1200" dirty="0"/>
+              <a:t>Although </a:t>
+            </a:r>
+            <a:r>
+              <a:rPr lang="en-US" sz="1200" dirty="0" smtClean="0"/>
+              <a:t>the </a:t>
+            </a:r>
+            <a:r>
+              <a:rPr lang="en-US" sz="1200" dirty="0"/>
+              <a:t>presentation shows a mobile phone based system, the proposed dual mode </a:t>
+            </a:r>
+            <a:r>
+              <a:rPr lang="en-US" sz="1200" dirty="0" smtClean="0"/>
+              <a:t>would </a:t>
+            </a:r>
+            <a:r>
+              <a:rPr lang="en-US" sz="1200" dirty="0"/>
+              <a:t>also support legacy </a:t>
+            </a:r>
+            <a:r>
+              <a:rPr lang="en-US" sz="1200" dirty="0" smtClean="0"/>
+              <a:t>schemes </a:t>
+            </a:r>
+            <a:r>
+              <a:rPr lang="en-US" sz="1200" dirty="0"/>
+              <a:t>like </a:t>
+            </a:r>
+            <a:r>
+              <a:rPr lang="en-US" sz="1200" dirty="0" smtClean="0"/>
+              <a:t>EMV</a:t>
+            </a:r>
+            <a:endParaRPr lang="en-US" sz="1200" dirty="0"/>
+          </a:p>
+        </p:txBody>
+      </p:sp>
     </p:spTree>
     <p:extLst>
       <p:ext uri="{BB962C8B-B14F-4D97-AF65-F5344CB8AC3E}">
@@ -24581,14 +24657,7 @@
                 <a:latin typeface="Arial" panose="020B0604020202020204" pitchFamily="34" charset="0"/>
                 <a:cs typeface="Arial" panose="020B0604020202020204" pitchFamily="34" charset="0"/>
               </a:rPr>
-              <a:t> Bank and an for each Merchant </a:t>
-            </a:r>
-            <a:r>
-              <a:rPr lang="en-US" sz="1200" dirty="0" smtClean="0">
-                <a:latin typeface="Arial" panose="020B0604020202020204" pitchFamily="34" charset="0"/>
-                <a:cs typeface="Arial" panose="020B0604020202020204" pitchFamily="34" charset="0"/>
-              </a:rPr>
-              <a:t>specific </a:t>
+              <a:t> Bank and an for each Merchant specific </a:t>
             </a:r>
             <a:r>
               <a:rPr lang="en-US" sz="1200" i="1" dirty="0" smtClean="0">
@@ -24600,19 +24669,7 @@
                 <a:latin typeface="Arial" panose="020B0604020202020204" pitchFamily="34" charset="0"/>
                 <a:cs typeface="Arial" panose="020B0604020202020204" pitchFamily="34" charset="0"/>
               </a:rPr>
-              <a:t>Public </a:t>
-            </a:r>
-            <a:r>
-              <a:rPr lang="en-US" sz="1200" i="1" dirty="0" smtClean="0">
-                <a:solidFill>
-                  <a:schemeClr val="accent6">
-                    <a:lumMod val="50000"/>
-                  </a:schemeClr>
-                </a:solidFill>
-                <a:latin typeface="Arial" panose="020B0604020202020204" pitchFamily="34" charset="0"/>
-                <a:cs typeface="Arial" panose="020B0604020202020204" pitchFamily="34" charset="0"/>
-              </a:rPr>
-              <a:t>Key</a:t>
+              <a:t>Public Key</a:t>
             </a:r>
             <a:r>
               <a:rPr lang="en-US" sz="1200" i="1" dirty="0" smtClean="0">
@@ -28601,1852 +28658,6 @@
 </p:sld>
 </file>
 
-<file path=ppt/slides/slide4.xml><?xml version="1.0" encoding="utf-8"?>
-<p:sld xmlns:a="http://schemas.openxmlformats.org/drawingml/2006/main" xmlns:r="http://schemas.openxmlformats.org/officeDocument/2006/relationships" xmlns:p="http://schemas.openxmlformats.org/presentationml/2006/main">
-  <p:cSld>
-    <p:spTree>
-      <p:nvGrpSpPr>
-        <p:cNvPr id="1" name=""/>
-        <p:cNvGrpSpPr/>
-        <p:nvPr/>
-      </p:nvGrpSpPr>
-      <p:grpSpPr>
-        <a:xfrm>
-          <a:off x="0" y="0"/>
-          <a:ext cx="0" cy="0"/>
-          <a:chOff x="0" y="0"/>
-          <a:chExt cx="0" cy="0"/>
-        </a:xfrm>
-      </p:grpSpPr>
-      <p:sp>
-        <p:nvSpPr>
-          <p:cNvPr id="3" name="Up-Down Arrow 2"/>
-          <p:cNvSpPr/>
-          <p:nvPr/>
-        </p:nvSpPr>
-        <p:spPr>
-          <a:xfrm>
-            <a:off x="4172794" y="685316"/>
-            <a:ext cx="198210" cy="828000"/>
-          </a:xfrm>
-          <a:prstGeom prst="upDownArrow">
-            <a:avLst/>
-          </a:prstGeom>
-          <a:solidFill>
-            <a:schemeClr val="tx2">
-              <a:lumMod val="40000"/>
-              <a:lumOff val="60000"/>
-            </a:schemeClr>
-          </a:solidFill>
-          <a:ln>
-            <a:noFill/>
-          </a:ln>
-        </p:spPr>
-        <p:style>
-          <a:lnRef idx="2">
-            <a:schemeClr val="accent1">
-              <a:shade val="50000"/>
-            </a:schemeClr>
-          </a:lnRef>
-          <a:fillRef idx="1">
-            <a:schemeClr val="accent1"/>
-          </a:fillRef>
-          <a:effectRef idx="0">
-            <a:schemeClr val="accent1"/>
-          </a:effectRef>
-          <a:fontRef idx="minor">
-            <a:schemeClr val="lt1"/>
-          </a:fontRef>
-        </p:style>
-        <p:txBody>
-          <a:bodyPr rtlCol="0" anchor="ctr"/>
-          <a:lstStyle/>
-          <a:p>
-            <a:pPr algn="ctr"/>
-            <a:endParaRPr lang="en-US"/>
-          </a:p>
-        </p:txBody>
-      </p:sp>
-      <p:sp>
-        <p:nvSpPr>
-          <p:cNvPr id="4" name="TextBox 3"/>
-          <p:cNvSpPr txBox="1"/>
-          <p:nvPr/>
-        </p:nvSpPr>
-        <p:spPr>
-          <a:xfrm>
-            <a:off x="2192512" y="919804"/>
-            <a:ext cx="4185698" cy="318801"/>
-          </a:xfrm>
-          <a:prstGeom prst="roundRect">
-            <a:avLst/>
-          </a:prstGeom>
-          <a:solidFill>
-            <a:srgbClr val="FBF7C9"/>
-          </a:solidFill>
-          <a:ln w="3175">
-            <a:solidFill>
-              <a:schemeClr val="tx1"/>
-            </a:solidFill>
-          </a:ln>
-          <a:effectLst>
-            <a:outerShdw blurRad="50800" dist="38100" dir="2700000" algn="tl" rotWithShape="0">
-              <a:prstClr val="black">
-                <a:alpha val="40000"/>
-              </a:prstClr>
-            </a:outerShdw>
-          </a:effectLst>
-        </p:spPr>
-        <p:txBody>
-          <a:bodyPr wrap="none" tIns="36000" bIns="36000" rtlCol="0" anchor="ctr" anchorCtr="1">
-            <a:spAutoFit/>
-          </a:bodyPr>
-          <a:lstStyle/>
-          <a:p>
-            <a:pPr algn="ctr"/>
-            <a:r>
-              <a:rPr lang="en-US" sz="1400" dirty="0" smtClean="0">
-                <a:latin typeface="Arial" panose="020B0604020202020204" pitchFamily="34" charset="0"/>
-                <a:cs typeface="Arial" panose="020B0604020202020204" pitchFamily="34" charset="0"/>
-              </a:rPr>
-              <a:t>High level End-to-End Secured </a:t>
-            </a:r>
-            <a:r>
-              <a:rPr lang="en-US" sz="1400" dirty="0">
-                <a:latin typeface="Arial" panose="020B0604020202020204" pitchFamily="34" charset="0"/>
-                <a:cs typeface="Arial" panose="020B0604020202020204" pitchFamily="34" charset="0"/>
-              </a:rPr>
-              <a:t>360° Web </a:t>
-            </a:r>
-            <a:r>
-              <a:rPr lang="en-US" sz="1400" dirty="0" smtClean="0">
-                <a:latin typeface="Arial" panose="020B0604020202020204" pitchFamily="34" charset="0"/>
-                <a:cs typeface="Arial" panose="020B0604020202020204" pitchFamily="34" charset="0"/>
-              </a:rPr>
-              <a:t>Protocol</a:t>
-            </a:r>
-            <a:endParaRPr lang="en-US" sz="1400" dirty="0">
-              <a:latin typeface="Arial" panose="020B0604020202020204" pitchFamily="34" charset="0"/>
-              <a:cs typeface="Arial" panose="020B0604020202020204" pitchFamily="34" charset="0"/>
-            </a:endParaRPr>
-          </a:p>
-        </p:txBody>
-      </p:sp>
-      <p:sp>
-        <p:nvSpPr>
-          <p:cNvPr id="9" name="TextBox 8"/>
-          <p:cNvSpPr txBox="1"/>
-          <p:nvPr/>
-        </p:nvSpPr>
-        <p:spPr>
-          <a:xfrm>
-            <a:off x="1043608" y="159023"/>
-            <a:ext cx="6467027" cy="461665"/>
-          </a:xfrm>
-          <a:prstGeom prst="rect">
-            <a:avLst/>
-          </a:prstGeom>
-          <a:noFill/>
-        </p:spPr>
-        <p:txBody>
-          <a:bodyPr wrap="none" rtlCol="0">
-            <a:spAutoFit/>
-          </a:bodyPr>
-          <a:lstStyle/>
-          <a:p>
-            <a:r>
-              <a:rPr lang="en-US" sz="2400" dirty="0" smtClean="0">
-                <a:latin typeface="Times New Roman" panose="02020603050405020304" pitchFamily="18" charset="0"/>
-                <a:cs typeface="Times New Roman" panose="02020603050405020304" pitchFamily="18" charset="0"/>
-              </a:rPr>
-              <a:t>End-User Experience - Personal Payment Terminal</a:t>
-            </a:r>
-            <a:endParaRPr lang="en-US" sz="2400" dirty="0">
-              <a:latin typeface="Times New Roman" panose="02020603050405020304" pitchFamily="18" charset="0"/>
-              <a:cs typeface="Times New Roman" panose="02020603050405020304" pitchFamily="18" charset="0"/>
-            </a:endParaRPr>
-          </a:p>
-        </p:txBody>
-      </p:sp>
-      <p:grpSp>
-        <p:nvGrpSpPr>
-          <p:cNvPr id="10" name="Group 9"/>
-          <p:cNvGrpSpPr/>
-          <p:nvPr/>
-        </p:nvGrpSpPr>
-        <p:grpSpPr>
-          <a:xfrm>
-            <a:off x="3020666" y="1549412"/>
-            <a:ext cx="2511077" cy="4680520"/>
-            <a:chOff x="796639" y="950200"/>
-            <a:chExt cx="2839257" cy="4824536"/>
-          </a:xfrm>
-          <a:effectLst>
-            <a:outerShdw blurRad="50800" dist="38100" dir="2700000" algn="tl" rotWithShape="0">
-              <a:prstClr val="black">
-                <a:alpha val="40000"/>
-              </a:prstClr>
-            </a:outerShdw>
-          </a:effectLst>
-        </p:grpSpPr>
-        <p:sp>
-          <p:nvSpPr>
-            <p:cNvPr id="11" name="Rounded Rectangle 10"/>
-            <p:cNvSpPr/>
-            <p:nvPr/>
-          </p:nvSpPr>
-          <p:spPr>
-            <a:xfrm>
-              <a:off x="796639" y="950200"/>
-              <a:ext cx="2839257" cy="4824536"/>
-            </a:xfrm>
-            <a:prstGeom prst="roundRect">
-              <a:avLst>
-                <a:gd name="adj" fmla="val 5335"/>
-              </a:avLst>
-            </a:prstGeom>
-            <a:solidFill>
-              <a:schemeClr val="bg2"/>
-            </a:solidFill>
-            <a:ln w="12700"/>
-            <a:effectLst/>
-            <a:scene3d>
-              <a:camera prst="orthographicFront"/>
-              <a:lightRig rig="threePt" dir="t"/>
-            </a:scene3d>
-            <a:sp3d>
-              <a:bevelT/>
-            </a:sp3d>
-          </p:spPr>
-          <p:style>
-            <a:lnRef idx="2">
-              <a:schemeClr val="accent1">
-                <a:shade val="50000"/>
-              </a:schemeClr>
-            </a:lnRef>
-            <a:fillRef idx="1">
-              <a:schemeClr val="accent1"/>
-            </a:fillRef>
-            <a:effectRef idx="0">
-              <a:schemeClr val="accent1"/>
-            </a:effectRef>
-            <a:fontRef idx="minor">
-              <a:schemeClr val="lt1"/>
-            </a:fontRef>
-          </p:style>
-          <p:txBody>
-            <a:bodyPr rtlCol="0" anchor="ctr"/>
-            <a:lstStyle/>
-            <a:p>
-              <a:pPr algn="ctr"/>
-              <a:endParaRPr lang="en-US"/>
-            </a:p>
-          </p:txBody>
-        </p:sp>
-        <p:sp>
-          <p:nvSpPr>
-            <p:cNvPr id="12" name="Rounded Rectangle 11"/>
-            <p:cNvSpPr/>
-            <p:nvPr/>
-          </p:nvSpPr>
-          <p:spPr>
-            <a:xfrm>
-              <a:off x="1928235" y="1142740"/>
-              <a:ext cx="555533" cy="72008"/>
-            </a:xfrm>
-            <a:prstGeom prst="roundRect">
-              <a:avLst/>
-            </a:prstGeom>
-            <a:pattFill prst="pct25">
-              <a:fgClr>
-                <a:schemeClr val="bg1">
-                  <a:lumMod val="65000"/>
-                </a:schemeClr>
-              </a:fgClr>
-              <a:bgClr>
-                <a:schemeClr val="bg1">
-                  <a:lumMod val="95000"/>
-                </a:schemeClr>
-              </a:bgClr>
-            </a:pattFill>
-            <a:ln w="6350">
-              <a:solidFill>
-                <a:schemeClr val="bg1">
-                  <a:lumMod val="50000"/>
-                </a:schemeClr>
-              </a:solidFill>
-            </a:ln>
-          </p:spPr>
-          <p:style>
-            <a:lnRef idx="2">
-              <a:schemeClr val="accent1">
-                <a:shade val="50000"/>
-              </a:schemeClr>
-            </a:lnRef>
-            <a:fillRef idx="1">
-              <a:schemeClr val="accent1"/>
-            </a:fillRef>
-            <a:effectRef idx="0">
-              <a:schemeClr val="accent1"/>
-            </a:effectRef>
-            <a:fontRef idx="minor">
-              <a:schemeClr val="lt1"/>
-            </a:fontRef>
-          </p:style>
-          <p:txBody>
-            <a:bodyPr rtlCol="0" anchor="ctr"/>
-            <a:lstStyle/>
-            <a:p>
-              <a:pPr algn="ctr"/>
-              <a:endParaRPr lang="en-US"/>
-            </a:p>
-          </p:txBody>
-        </p:sp>
-        <p:sp>
-          <p:nvSpPr>
-            <p:cNvPr id="13" name="Oval 12"/>
-            <p:cNvSpPr/>
-            <p:nvPr/>
-          </p:nvSpPr>
-          <p:spPr>
-            <a:xfrm>
-              <a:off x="1259632" y="1124744"/>
-              <a:ext cx="108000" cy="108000"/>
-            </a:xfrm>
-            <a:prstGeom prst="ellipse">
-              <a:avLst/>
-            </a:prstGeom>
-            <a:gradFill flip="none" rotWithShape="1">
-              <a:gsLst>
-                <a:gs pos="100000">
-                  <a:schemeClr val="accent1">
-                    <a:lumMod val="75000"/>
-                  </a:schemeClr>
-                </a:gs>
-                <a:gs pos="1875">
-                  <a:schemeClr val="accent1">
-                    <a:lumMod val="75000"/>
-                  </a:schemeClr>
-                </a:gs>
-                <a:gs pos="50000">
-                  <a:schemeClr val="accent1">
-                    <a:lumMod val="40000"/>
-                    <a:lumOff val="60000"/>
-                  </a:schemeClr>
-                </a:gs>
-              </a:gsLst>
-              <a:path path="circle">
-                <a:fillToRect l="100000" t="100000"/>
-              </a:path>
-              <a:tileRect r="-100000" b="-100000"/>
-            </a:gradFill>
-            <a:ln w="6350">
-              <a:solidFill>
-                <a:schemeClr val="bg1">
-                  <a:lumMod val="50000"/>
-                </a:schemeClr>
-              </a:solidFill>
-            </a:ln>
-          </p:spPr>
-          <p:style>
-            <a:lnRef idx="2">
-              <a:schemeClr val="accent1">
-                <a:shade val="50000"/>
-              </a:schemeClr>
-            </a:lnRef>
-            <a:fillRef idx="1">
-              <a:schemeClr val="accent1"/>
-            </a:fillRef>
-            <a:effectRef idx="0">
-              <a:schemeClr val="accent1"/>
-            </a:effectRef>
-            <a:fontRef idx="minor">
-              <a:schemeClr val="lt1"/>
-            </a:fontRef>
-          </p:style>
-          <p:txBody>
-            <a:bodyPr rtlCol="0" anchor="ctr"/>
-            <a:lstStyle/>
-            <a:p>
-              <a:pPr algn="ctr"/>
-              <a:endParaRPr lang="en-US"/>
-            </a:p>
-          </p:txBody>
-        </p:sp>
-        <p:sp>
-          <p:nvSpPr>
-            <p:cNvPr id="14" name="Oval 13"/>
-            <p:cNvSpPr/>
-            <p:nvPr/>
-          </p:nvSpPr>
-          <p:spPr>
-            <a:xfrm>
-              <a:off x="1763696" y="1142740"/>
-              <a:ext cx="72000" cy="72008"/>
-            </a:xfrm>
-            <a:prstGeom prst="ellipse">
-              <a:avLst/>
-            </a:prstGeom>
-            <a:solidFill>
-              <a:schemeClr val="bg1">
-                <a:lumMod val="95000"/>
-              </a:schemeClr>
-            </a:solidFill>
-            <a:ln w="6350">
-              <a:solidFill>
-                <a:schemeClr val="bg1">
-                  <a:lumMod val="50000"/>
-                </a:schemeClr>
-              </a:solidFill>
-            </a:ln>
-          </p:spPr>
-          <p:style>
-            <a:lnRef idx="2">
-              <a:schemeClr val="accent1">
-                <a:shade val="50000"/>
-              </a:schemeClr>
-            </a:lnRef>
-            <a:fillRef idx="1">
-              <a:schemeClr val="accent1"/>
-            </a:fillRef>
-            <a:effectRef idx="0">
-              <a:schemeClr val="accent1"/>
-            </a:effectRef>
-            <a:fontRef idx="minor">
-              <a:schemeClr val="lt1"/>
-            </a:fontRef>
-          </p:style>
-          <p:txBody>
-            <a:bodyPr rtlCol="0" anchor="ctr"/>
-            <a:lstStyle/>
-            <a:p>
-              <a:pPr algn="ctr"/>
-              <a:endParaRPr lang="en-US"/>
-            </a:p>
-          </p:txBody>
-        </p:sp>
-      </p:grpSp>
-      <p:pic>
-        <p:nvPicPr>
-          <p:cNvPr id="8" name="Picture 7"/>
-          <p:cNvPicPr>
-            <a:picLocks noChangeAspect="1"/>
-          </p:cNvPicPr>
-          <p:nvPr/>
-        </p:nvPicPr>
-        <p:blipFill>
-          <a:blip r:embed="rId2" cstate="print">
-            <a:extLst>
-              <a:ext uri="{28A0092B-C50C-407E-A947-70E740481C1C}">
-                <a14:useLocalDpi xmlns:a14="http://schemas.microsoft.com/office/drawing/2010/main" val="0"/>
-              </a:ext>
-            </a:extLst>
-          </a:blip>
-          <a:stretch>
-            <a:fillRect/>
-          </a:stretch>
-        </p:blipFill>
-        <p:spPr>
-          <a:xfrm>
-            <a:off x="3115441" y="1905223"/>
-            <a:ext cx="2312916" cy="4111851"/>
-          </a:xfrm>
-          <a:prstGeom prst="rect">
-            <a:avLst/>
-          </a:prstGeom>
-          <a:ln>
-            <a:solidFill>
-              <a:schemeClr val="bg1">
-                <a:lumMod val="65000"/>
-              </a:schemeClr>
-            </a:solidFill>
-          </a:ln>
-          <a:effectLst>
-            <a:outerShdw blurRad="50800" dist="38100" dir="2700000" sx="1000" sy="1000" algn="tl" rotWithShape="0">
-              <a:prstClr val="black">
-                <a:alpha val="40000"/>
-              </a:prstClr>
-            </a:outerShdw>
-          </a:effectLst>
-        </p:spPr>
-      </p:pic>
-      <p:cxnSp>
-        <p:nvCxnSpPr>
-          <p:cNvPr id="16" name="Straight Arrow Connector 15"/>
-          <p:cNvCxnSpPr/>
-          <p:nvPr/>
-        </p:nvCxnSpPr>
-        <p:spPr>
-          <a:xfrm flipH="1">
-            <a:off x="5548035" y="5578237"/>
-            <a:ext cx="547666" cy="0"/>
-          </a:xfrm>
-          <a:prstGeom prst="straightConnector1">
-            <a:avLst/>
-          </a:prstGeom>
-          <a:ln w="12700">
-            <a:solidFill>
-              <a:schemeClr val="accent6">
-                <a:lumMod val="75000"/>
-              </a:schemeClr>
-            </a:solidFill>
-            <a:tailEnd type="triangle" w="sm" len="sm"/>
-          </a:ln>
-        </p:spPr>
-        <p:style>
-          <a:lnRef idx="1">
-            <a:schemeClr val="accent1"/>
-          </a:lnRef>
-          <a:fillRef idx="0">
-            <a:schemeClr val="accent1"/>
-          </a:fillRef>
-          <a:effectRef idx="0">
-            <a:schemeClr val="accent1"/>
-          </a:effectRef>
-          <a:fontRef idx="minor">
-            <a:schemeClr val="tx1"/>
-          </a:fontRef>
-        </p:style>
-      </p:cxnSp>
-      <p:pic>
-        <p:nvPicPr>
-          <p:cNvPr id="18" name="Picture 8" descr="key"/>
-          <p:cNvPicPr>
-            <a:picLocks noChangeAspect="1" noChangeArrowheads="1"/>
-          </p:cNvPicPr>
-          <p:nvPr/>
-        </p:nvPicPr>
-        <p:blipFill>
-          <a:blip r:embed="rId3">
-            <a:extLst>
-              <a:ext uri="{BEBA8EAE-BF5A-486C-A8C5-ECC9F3942E4B}">
-                <a14:imgProps xmlns:a14="http://schemas.microsoft.com/office/drawing/2010/main">
-                  <a14:imgLayer r:embed="rId4">
-                    <a14:imgEffect>
-                      <a14:saturation sat="182000"/>
-                    </a14:imgEffect>
-                  </a14:imgLayer>
-                </a14:imgProps>
-              </a:ext>
-              <a:ext uri="{28A0092B-C50C-407E-A947-70E740481C1C}">
-                <a14:useLocalDpi xmlns:a14="http://schemas.microsoft.com/office/drawing/2010/main" val="0"/>
-              </a:ext>
-            </a:extLst>
-          </a:blip>
-          <a:srcRect/>
-          <a:stretch>
-            <a:fillRect/>
-          </a:stretch>
-        </p:blipFill>
-        <p:spPr bwMode="auto">
-          <a:xfrm rot="20680384">
-            <a:off x="6343085" y="5252656"/>
-            <a:ext cx="360040" cy="356341"/>
-          </a:xfrm>
-          <a:prstGeom prst="rect">
-            <a:avLst/>
-          </a:prstGeom>
-          <a:noFill/>
-          <a:ln>
-            <a:noFill/>
-          </a:ln>
-          <a:extLst>
-            <a:ext uri="{909E8E84-426E-40DD-AFC4-6F175D3DCCD1}">
-              <a14:hiddenFill xmlns:a14="http://schemas.microsoft.com/office/drawing/2010/main">
-                <a:solidFill>
-                  <a:srgbClr val="FFFFFF"/>
-                </a:solidFill>
-              </a14:hiddenFill>
-            </a:ext>
-            <a:ext uri="{91240B29-F687-4F45-9708-019B960494DF}">
-              <a14:hiddenLine xmlns:a14="http://schemas.microsoft.com/office/drawing/2010/main" w="9525">
-                <a:solidFill>
-                  <a:srgbClr val="000000"/>
-                </a:solidFill>
-                <a:miter lim="800000"/>
-                <a:headEnd/>
-                <a:tailEnd/>
-              </a14:hiddenLine>
-            </a:ext>
-          </a:extLst>
-        </p:spPr>
-      </p:pic>
-      <p:pic>
-        <p:nvPicPr>
-          <p:cNvPr id="19" name="Picture 8" descr="key"/>
-          <p:cNvPicPr>
-            <a:picLocks noChangeAspect="1" noChangeArrowheads="1"/>
-          </p:cNvPicPr>
-          <p:nvPr/>
-        </p:nvPicPr>
-        <p:blipFill>
-          <a:blip r:embed="rId3">
-            <a:extLst>
-              <a:ext uri="{BEBA8EAE-BF5A-486C-A8C5-ECC9F3942E4B}">
-                <a14:imgProps xmlns:a14="http://schemas.microsoft.com/office/drawing/2010/main">
-                  <a14:imgLayer r:embed="rId4">
-                    <a14:imgEffect>
-                      <a14:saturation sat="182000"/>
-                    </a14:imgEffect>
-                  </a14:imgLayer>
-                </a14:imgProps>
-              </a:ext>
-              <a:ext uri="{28A0092B-C50C-407E-A947-70E740481C1C}">
-                <a14:useLocalDpi xmlns:a14="http://schemas.microsoft.com/office/drawing/2010/main" val="0"/>
-              </a:ext>
-            </a:extLst>
-          </a:blip>
-          <a:srcRect/>
-          <a:stretch>
-            <a:fillRect/>
-          </a:stretch>
-        </p:blipFill>
-        <p:spPr bwMode="auto">
-          <a:xfrm rot="20680384">
-            <a:off x="6189692" y="5428251"/>
-            <a:ext cx="360040" cy="356341"/>
-          </a:xfrm>
-          <a:prstGeom prst="rect">
-            <a:avLst/>
-          </a:prstGeom>
-          <a:noFill/>
-          <a:ln>
-            <a:noFill/>
-          </a:ln>
-          <a:extLst>
-            <a:ext uri="{909E8E84-426E-40DD-AFC4-6F175D3DCCD1}">
-              <a14:hiddenFill xmlns:a14="http://schemas.microsoft.com/office/drawing/2010/main">
-                <a:solidFill>
-                  <a:srgbClr val="FFFFFF"/>
-                </a:solidFill>
-              </a14:hiddenFill>
-            </a:ext>
-            <a:ext uri="{91240B29-F687-4F45-9708-019B960494DF}">
-              <a14:hiddenLine xmlns:a14="http://schemas.microsoft.com/office/drawing/2010/main" w="9525">
-                <a:solidFill>
-                  <a:srgbClr val="000000"/>
-                </a:solidFill>
-                <a:miter lim="800000"/>
-                <a:headEnd/>
-                <a:tailEnd/>
-              </a14:hiddenLine>
-            </a:ext>
-          </a:extLst>
-        </p:spPr>
-      </p:pic>
-      <p:pic>
-        <p:nvPicPr>
-          <p:cNvPr id="20" name="Picture 8" descr="key"/>
-          <p:cNvPicPr>
-            <a:picLocks noChangeAspect="1" noChangeArrowheads="1"/>
-          </p:cNvPicPr>
-          <p:nvPr/>
-        </p:nvPicPr>
-        <p:blipFill>
-          <a:blip r:embed="rId3">
-            <a:extLst>
-              <a:ext uri="{BEBA8EAE-BF5A-486C-A8C5-ECC9F3942E4B}">
-                <a14:imgProps xmlns:a14="http://schemas.microsoft.com/office/drawing/2010/main">
-                  <a14:imgLayer r:embed="rId4">
-                    <a14:imgEffect>
-                      <a14:saturation sat="182000"/>
-                    </a14:imgEffect>
-                  </a14:imgLayer>
-                </a14:imgProps>
-              </a:ext>
-              <a:ext uri="{28A0092B-C50C-407E-A947-70E740481C1C}">
-                <a14:useLocalDpi xmlns:a14="http://schemas.microsoft.com/office/drawing/2010/main" val="0"/>
-              </a:ext>
-            </a:extLst>
-          </a:blip>
-          <a:srcRect/>
-          <a:stretch>
-            <a:fillRect/>
-          </a:stretch>
-        </p:blipFill>
-        <p:spPr bwMode="auto">
-          <a:xfrm rot="20680384">
-            <a:off x="6045675" y="5619485"/>
-            <a:ext cx="360040" cy="356341"/>
-          </a:xfrm>
-          <a:prstGeom prst="rect">
-            <a:avLst/>
-          </a:prstGeom>
-          <a:noFill/>
-          <a:ln>
-            <a:noFill/>
-          </a:ln>
-          <a:extLst>
-            <a:ext uri="{909E8E84-426E-40DD-AFC4-6F175D3DCCD1}">
-              <a14:hiddenFill xmlns:a14="http://schemas.microsoft.com/office/drawing/2010/main">
-                <a:solidFill>
-                  <a:srgbClr val="FFFFFF"/>
-                </a:solidFill>
-              </a14:hiddenFill>
-            </a:ext>
-            <a:ext uri="{91240B29-F687-4F45-9708-019B960494DF}">
-              <a14:hiddenLine xmlns:a14="http://schemas.microsoft.com/office/drawing/2010/main" w="9525">
-                <a:solidFill>
-                  <a:srgbClr val="000000"/>
-                </a:solidFill>
-                <a:miter lim="800000"/>
-                <a:headEnd/>
-                <a:tailEnd/>
-              </a14:hiddenLine>
-            </a:ext>
-          </a:extLst>
-        </p:spPr>
-      </p:pic>
-      <p:sp>
-        <p:nvSpPr>
-          <p:cNvPr id="21" name="TextBox 20"/>
-          <p:cNvSpPr txBox="1"/>
-          <p:nvPr/>
-        </p:nvSpPr>
-        <p:spPr>
-          <a:xfrm>
-            <a:off x="5624576" y="5922155"/>
-            <a:ext cx="1798890" cy="307777"/>
-          </a:xfrm>
-          <a:prstGeom prst="rect">
-            <a:avLst/>
-          </a:prstGeom>
-          <a:noFill/>
-        </p:spPr>
-        <p:txBody>
-          <a:bodyPr wrap="none" rtlCol="0">
-            <a:spAutoFit/>
-          </a:bodyPr>
-          <a:lstStyle/>
-          <a:p>
-            <a:pPr algn="ctr"/>
-            <a:r>
-              <a:rPr lang="en-US" sz="1400" dirty="0" smtClean="0">
-                <a:latin typeface="Arial" panose="020B0604020202020204" pitchFamily="34" charset="0"/>
-                <a:cs typeface="Arial" panose="020B0604020202020204" pitchFamily="34" charset="0"/>
-              </a:rPr>
-              <a:t>TEE Protected Keys</a:t>
-            </a:r>
-            <a:endParaRPr lang="en-US" sz="1400" dirty="0">
-              <a:latin typeface="Arial" panose="020B0604020202020204" pitchFamily="34" charset="0"/>
-              <a:cs typeface="Arial" panose="020B0604020202020204" pitchFamily="34" charset="0"/>
-            </a:endParaRPr>
-          </a:p>
-        </p:txBody>
-      </p:sp>
-      <p:cxnSp>
-        <p:nvCxnSpPr>
-          <p:cNvPr id="23" name="Straight Arrow Connector 22"/>
-          <p:cNvCxnSpPr/>
-          <p:nvPr/>
-        </p:nvCxnSpPr>
-        <p:spPr>
-          <a:xfrm flipH="1">
-            <a:off x="4744414" y="3138008"/>
-            <a:ext cx="907706" cy="0"/>
-          </a:xfrm>
-          <a:prstGeom prst="straightConnector1">
-            <a:avLst/>
-          </a:prstGeom>
-          <a:ln w="12700">
-            <a:solidFill>
-              <a:schemeClr val="accent6">
-                <a:lumMod val="75000"/>
-              </a:schemeClr>
-            </a:solidFill>
-            <a:tailEnd type="triangle" w="sm" len="sm"/>
-          </a:ln>
-        </p:spPr>
-        <p:style>
-          <a:lnRef idx="1">
-            <a:schemeClr val="accent1"/>
-          </a:lnRef>
-          <a:fillRef idx="0">
-            <a:schemeClr val="accent1"/>
-          </a:fillRef>
-          <a:effectRef idx="0">
-            <a:schemeClr val="accent1"/>
-          </a:effectRef>
-          <a:fontRef idx="minor">
-            <a:schemeClr val="tx1"/>
-          </a:fontRef>
-        </p:style>
-      </p:cxnSp>
-      <p:sp>
-        <p:nvSpPr>
-          <p:cNvPr id="24" name="TextBox 23"/>
-          <p:cNvSpPr txBox="1"/>
-          <p:nvPr/>
-        </p:nvSpPr>
-        <p:spPr>
-          <a:xfrm>
-            <a:off x="5624576" y="2989572"/>
-            <a:ext cx="1912639" cy="307777"/>
-          </a:xfrm>
-          <a:prstGeom prst="rect">
-            <a:avLst/>
-          </a:prstGeom>
-          <a:noFill/>
-        </p:spPr>
-        <p:txBody>
-          <a:bodyPr wrap="none" rtlCol="0">
-            <a:spAutoFit/>
-          </a:bodyPr>
-          <a:lstStyle/>
-          <a:p>
-            <a:r>
-              <a:rPr lang="en-US" sz="1400" dirty="0" smtClean="0">
-                <a:latin typeface="Arial" panose="020B0604020202020204" pitchFamily="34" charset="0"/>
-                <a:cs typeface="Arial" panose="020B0604020202020204" pitchFamily="34" charset="0"/>
-              </a:rPr>
-              <a:t>Virtual Card </a:t>
-            </a:r>
-            <a:r>
-              <a:rPr lang="en-US" sz="1400" dirty="0" smtClean="0">
-                <a:latin typeface="Arial" panose="020B0604020202020204" pitchFamily="34" charset="0"/>
-                <a:cs typeface="Arial" panose="020B0604020202020204" pitchFamily="34" charset="0"/>
-              </a:rPr>
-              <a:t>Logotype</a:t>
-            </a:r>
-            <a:endParaRPr lang="en-US" sz="1400" dirty="0">
-              <a:latin typeface="Arial" panose="020B0604020202020204" pitchFamily="34" charset="0"/>
-              <a:cs typeface="Arial" panose="020B0604020202020204" pitchFamily="34" charset="0"/>
-            </a:endParaRPr>
-          </a:p>
-        </p:txBody>
-      </p:sp>
-      <p:cxnSp>
-        <p:nvCxnSpPr>
-          <p:cNvPr id="26" name="Straight Arrow Connector 25"/>
-          <p:cNvCxnSpPr/>
-          <p:nvPr/>
-        </p:nvCxnSpPr>
-        <p:spPr>
-          <a:xfrm flipH="1">
-            <a:off x="4824000" y="3633986"/>
-            <a:ext cx="828000" cy="0"/>
-          </a:xfrm>
-          <a:prstGeom prst="straightConnector1">
-            <a:avLst/>
-          </a:prstGeom>
-          <a:ln w="12700">
-            <a:solidFill>
-              <a:schemeClr val="accent6">
-                <a:lumMod val="75000"/>
-              </a:schemeClr>
-            </a:solidFill>
-            <a:tailEnd type="triangle" w="sm" len="sm"/>
-          </a:ln>
-        </p:spPr>
-        <p:style>
-          <a:lnRef idx="1">
-            <a:schemeClr val="accent1"/>
-          </a:lnRef>
-          <a:fillRef idx="0">
-            <a:schemeClr val="accent1"/>
-          </a:fillRef>
-          <a:effectRef idx="0">
-            <a:schemeClr val="accent1"/>
-          </a:effectRef>
-          <a:fontRef idx="minor">
-            <a:schemeClr val="tx1"/>
-          </a:fontRef>
-        </p:style>
-      </p:cxnSp>
-      <p:sp>
-        <p:nvSpPr>
-          <p:cNvPr id="27" name="TextBox 26"/>
-          <p:cNvSpPr txBox="1"/>
-          <p:nvPr/>
-        </p:nvSpPr>
-        <p:spPr>
-          <a:xfrm>
-            <a:off x="5624576" y="3372376"/>
-            <a:ext cx="1827744" cy="523220"/>
-          </a:xfrm>
-          <a:prstGeom prst="rect">
-            <a:avLst/>
-          </a:prstGeom>
-          <a:noFill/>
-        </p:spPr>
-        <p:txBody>
-          <a:bodyPr wrap="none" rtlCol="0">
-            <a:spAutoFit/>
-          </a:bodyPr>
-          <a:lstStyle/>
-          <a:p>
-            <a:r>
-              <a:rPr lang="en-US" sz="1400" i="1" dirty="0" smtClean="0">
-                <a:latin typeface="Arial" panose="020B0604020202020204" pitchFamily="34" charset="0"/>
-                <a:cs typeface="Arial" panose="020B0604020202020204" pitchFamily="34" charset="0"/>
-              </a:rPr>
-              <a:t>Optional</a:t>
-            </a:r>
-            <a:r>
-              <a:rPr lang="en-US" sz="1400" dirty="0" smtClean="0">
-                <a:latin typeface="Arial" panose="020B0604020202020204" pitchFamily="34" charset="0"/>
-                <a:cs typeface="Arial" panose="020B0604020202020204" pitchFamily="34" charset="0"/>
-              </a:rPr>
-              <a:t>: Real-Time</a:t>
-            </a:r>
-            <a:br>
-              <a:rPr lang="en-US" sz="1400" dirty="0" smtClean="0">
-                <a:latin typeface="Arial" panose="020B0604020202020204" pitchFamily="34" charset="0"/>
-                <a:cs typeface="Arial" panose="020B0604020202020204" pitchFamily="34" charset="0"/>
-              </a:rPr>
-            </a:br>
-            <a:r>
-              <a:rPr lang="en-US" sz="1400" dirty="0" smtClean="0">
-                <a:latin typeface="Arial" panose="020B0604020202020204" pitchFamily="34" charset="0"/>
-                <a:cs typeface="Arial" panose="020B0604020202020204" pitchFamily="34" charset="0"/>
-              </a:rPr>
-              <a:t>Account Balance</a:t>
-            </a:r>
-            <a:endParaRPr lang="en-US" sz="1400" dirty="0">
-              <a:latin typeface="Arial" panose="020B0604020202020204" pitchFamily="34" charset="0"/>
-              <a:cs typeface="Arial" panose="020B0604020202020204" pitchFamily="34" charset="0"/>
-            </a:endParaRPr>
-          </a:p>
-        </p:txBody>
-      </p:sp>
-      <p:cxnSp>
-        <p:nvCxnSpPr>
-          <p:cNvPr id="29" name="Straight Arrow Connector 28"/>
-          <p:cNvCxnSpPr/>
-          <p:nvPr/>
-        </p:nvCxnSpPr>
-        <p:spPr>
-          <a:xfrm flipH="1" flipV="1">
-            <a:off x="5098128" y="2410081"/>
-            <a:ext cx="553992" cy="4229"/>
-          </a:xfrm>
-          <a:prstGeom prst="straightConnector1">
-            <a:avLst/>
-          </a:prstGeom>
-          <a:ln w="12700">
-            <a:solidFill>
-              <a:schemeClr val="accent6">
-                <a:lumMod val="75000"/>
-              </a:schemeClr>
-            </a:solidFill>
-            <a:tailEnd type="triangle" w="sm" len="sm"/>
-          </a:ln>
-        </p:spPr>
-        <p:style>
-          <a:lnRef idx="1">
-            <a:schemeClr val="accent1"/>
-          </a:lnRef>
-          <a:fillRef idx="0">
-            <a:schemeClr val="accent1"/>
-          </a:fillRef>
-          <a:effectRef idx="0">
-            <a:schemeClr val="accent1"/>
-          </a:effectRef>
-          <a:fontRef idx="minor">
-            <a:schemeClr val="tx1"/>
-          </a:fontRef>
-        </p:style>
-      </p:cxnSp>
-      <p:sp>
-        <p:nvSpPr>
-          <p:cNvPr id="30" name="TextBox 29"/>
-          <p:cNvSpPr txBox="1"/>
-          <p:nvPr/>
-        </p:nvSpPr>
-        <p:spPr>
-          <a:xfrm>
-            <a:off x="5624576" y="2042384"/>
-            <a:ext cx="1577420" cy="738664"/>
-          </a:xfrm>
-          <a:prstGeom prst="rect">
-            <a:avLst/>
-          </a:prstGeom>
-          <a:noFill/>
-        </p:spPr>
-        <p:txBody>
-          <a:bodyPr wrap="none" rtlCol="0">
-            <a:spAutoFit/>
-          </a:bodyPr>
-          <a:lstStyle/>
-          <a:p>
-            <a:r>
-              <a:rPr lang="en-US" sz="1400" dirty="0" smtClean="0">
-                <a:latin typeface="Arial" panose="020B0604020202020204" pitchFamily="34" charset="0"/>
-                <a:cs typeface="Arial" panose="020B0604020202020204" pitchFamily="34" charset="0"/>
-              </a:rPr>
-              <a:t>Adapted to</a:t>
-            </a:r>
-            <a:r>
-              <a:rPr lang="en-US" sz="1400" dirty="0" smtClean="0">
-                <a:latin typeface="Arial" panose="020B0604020202020204" pitchFamily="34" charset="0"/>
-                <a:cs typeface="Arial" panose="020B0604020202020204" pitchFamily="34" charset="0"/>
-              </a:rPr>
-              <a:t>:</a:t>
-            </a:r>
-          </a:p>
-          <a:p>
-            <a:pPr marL="162000" indent="-162000">
-              <a:buFont typeface="Arial" panose="020B0604020202020204" pitchFamily="34" charset="0"/>
-              <a:buChar char="•"/>
-            </a:pPr>
-            <a:r>
-              <a:rPr lang="en-US" sz="1400" i="1" dirty="0" smtClean="0">
-                <a:latin typeface="Arial" panose="020B0604020202020204" pitchFamily="34" charset="0"/>
-                <a:cs typeface="Arial" panose="020B0604020202020204" pitchFamily="34" charset="0"/>
-              </a:rPr>
-              <a:t>Your </a:t>
-            </a:r>
-            <a:r>
-              <a:rPr lang="en-US" sz="1400" dirty="0" smtClean="0">
-                <a:latin typeface="Arial" panose="020B0604020202020204" pitchFamily="34" charset="0"/>
-                <a:cs typeface="Arial" panose="020B0604020202020204" pitchFamily="34" charset="0"/>
-              </a:rPr>
-              <a:t>Language</a:t>
-            </a:r>
-          </a:p>
-          <a:p>
-            <a:pPr marL="162000" indent="-162000">
-              <a:buFont typeface="Arial" panose="020B0604020202020204" pitchFamily="34" charset="0"/>
-              <a:buChar char="•"/>
-            </a:pPr>
-            <a:r>
-              <a:rPr lang="en-US" sz="1400" i="1" dirty="0" smtClean="0">
-                <a:latin typeface="Arial" panose="020B0604020202020204" pitchFamily="34" charset="0"/>
-                <a:cs typeface="Arial" panose="020B0604020202020204" pitchFamily="34" charset="0"/>
-              </a:rPr>
-              <a:t>Your</a:t>
-            </a:r>
-            <a:r>
-              <a:rPr lang="en-US" sz="1400" dirty="0" smtClean="0">
-                <a:latin typeface="Arial" panose="020B0604020202020204" pitchFamily="34" charset="0"/>
-                <a:cs typeface="Arial" panose="020B0604020202020204" pitchFamily="34" charset="0"/>
-              </a:rPr>
-              <a:t> </a:t>
-            </a:r>
-            <a:r>
-              <a:rPr lang="en-US" sz="1400" dirty="0" smtClean="0">
-                <a:latin typeface="Arial" panose="020B0604020202020204" pitchFamily="34" charset="0"/>
-                <a:cs typeface="Arial" panose="020B0604020202020204" pitchFamily="34" charset="0"/>
-              </a:rPr>
-              <a:t>Disability</a:t>
-            </a:r>
-            <a:endParaRPr lang="en-US" sz="1400" dirty="0">
-              <a:latin typeface="Arial" panose="020B0604020202020204" pitchFamily="34" charset="0"/>
-              <a:cs typeface="Arial" panose="020B0604020202020204" pitchFamily="34" charset="0"/>
-            </a:endParaRPr>
-          </a:p>
-        </p:txBody>
-      </p:sp>
-      <p:cxnSp>
-        <p:nvCxnSpPr>
-          <p:cNvPr id="32" name="Straight Arrow Connector 31"/>
-          <p:cNvCxnSpPr/>
-          <p:nvPr/>
-        </p:nvCxnSpPr>
-        <p:spPr>
-          <a:xfrm flipH="1">
-            <a:off x="4932120" y="4288225"/>
-            <a:ext cx="720000" cy="0"/>
-          </a:xfrm>
-          <a:prstGeom prst="straightConnector1">
-            <a:avLst/>
-          </a:prstGeom>
-          <a:ln w="12700">
-            <a:solidFill>
-              <a:schemeClr val="accent6">
-                <a:lumMod val="75000"/>
-              </a:schemeClr>
-            </a:solidFill>
-            <a:tailEnd type="triangle" w="sm" len="sm"/>
-          </a:ln>
-        </p:spPr>
-        <p:style>
-          <a:lnRef idx="1">
-            <a:schemeClr val="accent1"/>
-          </a:lnRef>
-          <a:fillRef idx="0">
-            <a:schemeClr val="accent1"/>
-          </a:fillRef>
-          <a:effectRef idx="0">
-            <a:schemeClr val="accent1"/>
-          </a:effectRef>
-          <a:fontRef idx="minor">
-            <a:schemeClr val="tx1"/>
-          </a:fontRef>
-        </p:style>
-      </p:cxnSp>
-      <p:sp>
-        <p:nvSpPr>
-          <p:cNvPr id="33" name="TextBox 32"/>
-          <p:cNvSpPr txBox="1"/>
-          <p:nvPr/>
-        </p:nvSpPr>
-        <p:spPr>
-          <a:xfrm>
-            <a:off x="5624576" y="3918150"/>
-            <a:ext cx="1588897" cy="1169551"/>
-          </a:xfrm>
-          <a:prstGeom prst="rect">
-            <a:avLst/>
-          </a:prstGeom>
-          <a:noFill/>
-        </p:spPr>
-        <p:txBody>
-          <a:bodyPr wrap="none" rtlCol="0">
-            <a:spAutoFit/>
-          </a:bodyPr>
-          <a:lstStyle/>
-          <a:p>
-            <a:r>
-              <a:rPr lang="en-US" sz="1400" dirty="0" smtClean="0">
-                <a:latin typeface="Arial" panose="020B0604020202020204" pitchFamily="34" charset="0"/>
-                <a:cs typeface="Arial" panose="020B0604020202020204" pitchFamily="34" charset="0"/>
-              </a:rPr>
-              <a:t>UI Showing:</a:t>
-            </a:r>
-          </a:p>
-          <a:p>
-            <a:pPr marL="177800" indent="-177800">
-              <a:buFont typeface="Arial" panose="020B0604020202020204" pitchFamily="34" charset="0"/>
-              <a:buChar char="•"/>
-            </a:pPr>
-            <a:r>
-              <a:rPr lang="en-US" sz="1400" dirty="0" smtClean="0">
-                <a:latin typeface="Arial" panose="020B0604020202020204" pitchFamily="34" charset="0"/>
-                <a:cs typeface="Arial" panose="020B0604020202020204" pitchFamily="34" charset="0"/>
-              </a:rPr>
-              <a:t>Direct Payment</a:t>
-            </a:r>
-          </a:p>
-          <a:p>
-            <a:pPr marL="177800" indent="-177800">
-              <a:buFont typeface="Arial" panose="020B0604020202020204" pitchFamily="34" charset="0"/>
-              <a:buChar char="•"/>
-            </a:pPr>
-            <a:r>
-              <a:rPr lang="en-US" sz="1400" dirty="0" smtClean="0">
-                <a:latin typeface="Arial" panose="020B0604020202020204" pitchFamily="34" charset="0"/>
-                <a:cs typeface="Arial" panose="020B0604020202020204" pitchFamily="34" charset="0"/>
-              </a:rPr>
-              <a:t>Booking</a:t>
-            </a:r>
-            <a:endParaRPr lang="en-US" sz="1400" dirty="0">
-              <a:latin typeface="Arial" panose="020B0604020202020204" pitchFamily="34" charset="0"/>
-              <a:cs typeface="Arial" panose="020B0604020202020204" pitchFamily="34" charset="0"/>
-            </a:endParaRPr>
-          </a:p>
-          <a:p>
-            <a:pPr marL="177800" indent="-177800">
-              <a:buFont typeface="Arial" panose="020B0604020202020204" pitchFamily="34" charset="0"/>
-              <a:buChar char="•"/>
-            </a:pPr>
-            <a:r>
-              <a:rPr lang="en-US" sz="1400" dirty="0" smtClean="0">
-                <a:latin typeface="Arial" panose="020B0604020202020204" pitchFamily="34" charset="0"/>
-                <a:cs typeface="Arial" panose="020B0604020202020204" pitchFamily="34" charset="0"/>
-              </a:rPr>
-              <a:t>Gas Station</a:t>
-            </a:r>
-          </a:p>
-          <a:p>
-            <a:pPr marL="177800" indent="-177800">
-              <a:buFont typeface="Arial" panose="020B0604020202020204" pitchFamily="34" charset="0"/>
-              <a:buChar char="•"/>
-            </a:pPr>
-            <a:r>
-              <a:rPr lang="en-US" sz="1400" dirty="0" smtClean="0">
-                <a:latin typeface="Arial" panose="020B0604020202020204" pitchFamily="34" charset="0"/>
-                <a:cs typeface="Arial" panose="020B0604020202020204" pitchFamily="34" charset="0"/>
-              </a:rPr>
-              <a:t>Etc.</a:t>
-            </a:r>
-            <a:endParaRPr lang="en-US" sz="1400" dirty="0">
-              <a:latin typeface="Arial" panose="020B0604020202020204" pitchFamily="34" charset="0"/>
-              <a:cs typeface="Arial" panose="020B0604020202020204" pitchFamily="34" charset="0"/>
-            </a:endParaRPr>
-          </a:p>
-        </p:txBody>
-      </p:sp>
-      <p:grpSp>
-        <p:nvGrpSpPr>
-          <p:cNvPr id="34" name="Group 33"/>
-          <p:cNvGrpSpPr/>
-          <p:nvPr/>
-        </p:nvGrpSpPr>
-        <p:grpSpPr>
-          <a:xfrm>
-            <a:off x="2706412" y="5365836"/>
-            <a:ext cx="4130678" cy="1231516"/>
-            <a:chOff x="4257746" y="5387398"/>
-            <a:chExt cx="4130678" cy="1231516"/>
-          </a:xfrm>
-        </p:grpSpPr>
-        <p:sp>
-          <p:nvSpPr>
-            <p:cNvPr id="35" name="TextBox 34"/>
-            <p:cNvSpPr txBox="1"/>
-            <p:nvPr/>
-          </p:nvSpPr>
-          <p:spPr>
-            <a:xfrm>
-              <a:off x="4819319" y="6311137"/>
-              <a:ext cx="3569105" cy="307777"/>
-            </a:xfrm>
-            <a:prstGeom prst="rect">
-              <a:avLst/>
-            </a:prstGeom>
-            <a:noFill/>
-          </p:spPr>
-          <p:txBody>
-            <a:bodyPr wrap="square" rtlCol="0">
-              <a:spAutoFit/>
-            </a:bodyPr>
-            <a:lstStyle/>
-            <a:p>
-              <a:r>
-                <a:rPr lang="en-US" sz="1400" dirty="0" smtClean="0">
-                  <a:latin typeface="Arial" panose="020B0604020202020204" pitchFamily="34" charset="0"/>
-                  <a:cs typeface="Arial" panose="020B0604020202020204" pitchFamily="34" charset="0"/>
-                </a:rPr>
-                <a:t>PIN or Biometric</a:t>
-              </a:r>
-              <a:r>
-                <a:rPr lang="en-US" sz="1400" dirty="0">
-                  <a:latin typeface="Arial" panose="020B0604020202020204" pitchFamily="34" charset="0"/>
-                  <a:cs typeface="Arial" panose="020B0604020202020204" pitchFamily="34" charset="0"/>
-                </a:rPr>
-                <a:t> </a:t>
-              </a:r>
-              <a:r>
-                <a:rPr lang="en-US" sz="1400" dirty="0" smtClean="0">
-                  <a:latin typeface="Arial" panose="020B0604020202020204" pitchFamily="34" charset="0"/>
-                  <a:cs typeface="Arial" panose="020B0604020202020204" pitchFamily="34" charset="0"/>
-                </a:rPr>
-                <a:t>for User Authorization</a:t>
-              </a:r>
-              <a:endParaRPr lang="en-US" sz="1400" dirty="0">
-                <a:latin typeface="Arial" panose="020B0604020202020204" pitchFamily="34" charset="0"/>
-                <a:cs typeface="Arial" panose="020B0604020202020204" pitchFamily="34" charset="0"/>
-              </a:endParaRPr>
-            </a:p>
-          </p:txBody>
-        </p:sp>
-        <p:sp>
-          <p:nvSpPr>
-            <p:cNvPr id="36" name="Freeform 35"/>
-            <p:cNvSpPr/>
-            <p:nvPr/>
-          </p:nvSpPr>
-          <p:spPr>
-            <a:xfrm>
-              <a:off x="4257746" y="5387398"/>
-              <a:ext cx="588099" cy="1081570"/>
-            </a:xfrm>
-            <a:custGeom>
-              <a:avLst/>
-              <a:gdLst>
-                <a:gd name="connsiteX0" fmla="*/ 0 w 377851"/>
-                <a:gd name="connsiteY0" fmla="*/ 128473 h 128473"/>
-                <a:gd name="connsiteX1" fmla="*/ 83127 w 377851"/>
-                <a:gd name="connsiteY1" fmla="*/ 83131 h 128473"/>
-                <a:gd name="connsiteX2" fmla="*/ 173811 w 377851"/>
-                <a:gd name="connsiteY2" fmla="*/ 60460 h 128473"/>
-                <a:gd name="connsiteX3" fmla="*/ 309838 w 377851"/>
-                <a:gd name="connsiteY3" fmla="*/ 15118 h 128473"/>
-                <a:gd name="connsiteX4" fmla="*/ 377851 w 377851"/>
-                <a:gd name="connsiteY4" fmla="*/ 3 h 128473"/>
-                <a:gd name="connsiteX0" fmla="*/ 0 w 778373"/>
-                <a:gd name="connsiteY0" fmla="*/ 816159 h 816159"/>
-                <a:gd name="connsiteX1" fmla="*/ 83127 w 778373"/>
-                <a:gd name="connsiteY1" fmla="*/ 770817 h 816159"/>
-                <a:gd name="connsiteX2" fmla="*/ 173811 w 778373"/>
-                <a:gd name="connsiteY2" fmla="*/ 748146 h 816159"/>
-                <a:gd name="connsiteX3" fmla="*/ 309838 w 778373"/>
-                <a:gd name="connsiteY3" fmla="*/ 702804 h 816159"/>
-                <a:gd name="connsiteX4" fmla="*/ 778373 w 778373"/>
-                <a:gd name="connsiteY4" fmla="*/ 0 h 816159"/>
-                <a:gd name="connsiteX0" fmla="*/ 0 w 778373"/>
-                <a:gd name="connsiteY0" fmla="*/ 820394 h 820394"/>
-                <a:gd name="connsiteX1" fmla="*/ 83127 w 778373"/>
-                <a:gd name="connsiteY1" fmla="*/ 775052 h 820394"/>
-                <a:gd name="connsiteX2" fmla="*/ 173811 w 778373"/>
-                <a:gd name="connsiteY2" fmla="*/ 752381 h 820394"/>
-                <a:gd name="connsiteX3" fmla="*/ 302281 w 778373"/>
-                <a:gd name="connsiteY3" fmla="*/ 94920 h 820394"/>
-                <a:gd name="connsiteX4" fmla="*/ 778373 w 778373"/>
-                <a:gd name="connsiteY4" fmla="*/ 4235 h 820394"/>
-                <a:gd name="connsiteX0" fmla="*/ 656097 w 724109"/>
-                <a:gd name="connsiteY0" fmla="*/ 752380 h 809393"/>
-                <a:gd name="connsiteX1" fmla="*/ 28863 w 724109"/>
-                <a:gd name="connsiteY1" fmla="*/ 775052 h 809393"/>
-                <a:gd name="connsiteX2" fmla="*/ 119547 w 724109"/>
-                <a:gd name="connsiteY2" fmla="*/ 752381 h 809393"/>
-                <a:gd name="connsiteX3" fmla="*/ 248017 w 724109"/>
-                <a:gd name="connsiteY3" fmla="*/ 94920 h 809393"/>
-                <a:gd name="connsiteX4" fmla="*/ 724109 w 724109"/>
-                <a:gd name="connsiteY4" fmla="*/ 4235 h 809393"/>
-                <a:gd name="connsiteX0" fmla="*/ 642713 w 710725"/>
-                <a:gd name="connsiteY0" fmla="*/ 753327 h 815624"/>
-                <a:gd name="connsiteX1" fmla="*/ 15479 w 710725"/>
-                <a:gd name="connsiteY1" fmla="*/ 775999 h 815624"/>
-                <a:gd name="connsiteX2" fmla="*/ 234633 w 710725"/>
-                <a:gd name="connsiteY2" fmla="*/ 95867 h 815624"/>
-                <a:gd name="connsiteX3" fmla="*/ 710725 w 710725"/>
-                <a:gd name="connsiteY3" fmla="*/ 5182 h 815624"/>
-                <a:gd name="connsiteX0" fmla="*/ 650546 w 718558"/>
-                <a:gd name="connsiteY0" fmla="*/ 764075 h 828252"/>
-                <a:gd name="connsiteX1" fmla="*/ 23312 w 718558"/>
-                <a:gd name="connsiteY1" fmla="*/ 786747 h 828252"/>
-                <a:gd name="connsiteX2" fmla="*/ 190078 w 718558"/>
-                <a:gd name="connsiteY2" fmla="*/ 80421 h 828252"/>
-                <a:gd name="connsiteX3" fmla="*/ 718558 w 718558"/>
-                <a:gd name="connsiteY3" fmla="*/ 15930 h 828252"/>
-                <a:gd name="connsiteX0" fmla="*/ 650546 w 718558"/>
-                <a:gd name="connsiteY0" fmla="*/ 764075 h 828252"/>
-                <a:gd name="connsiteX1" fmla="*/ 23312 w 718558"/>
-                <a:gd name="connsiteY1" fmla="*/ 786747 h 828252"/>
-                <a:gd name="connsiteX2" fmla="*/ 190078 w 718558"/>
-                <a:gd name="connsiteY2" fmla="*/ 80421 h 828252"/>
-                <a:gd name="connsiteX3" fmla="*/ 718558 w 718558"/>
-                <a:gd name="connsiteY3" fmla="*/ 15930 h 828252"/>
-                <a:gd name="connsiteX0" fmla="*/ 650546 w 718558"/>
-                <a:gd name="connsiteY0" fmla="*/ 748145 h 812322"/>
-                <a:gd name="connsiteX1" fmla="*/ 23312 w 718558"/>
-                <a:gd name="connsiteY1" fmla="*/ 770817 h 812322"/>
-                <a:gd name="connsiteX2" fmla="*/ 190078 w 718558"/>
-                <a:gd name="connsiteY2" fmla="*/ 64491 h 812322"/>
-                <a:gd name="connsiteX3" fmla="*/ 718558 w 718558"/>
-                <a:gd name="connsiteY3" fmla="*/ 0 h 812322"/>
-                <a:gd name="connsiteX0" fmla="*/ 650546 w 718558"/>
-                <a:gd name="connsiteY0" fmla="*/ 748145 h 812322"/>
-                <a:gd name="connsiteX1" fmla="*/ 23312 w 718558"/>
-                <a:gd name="connsiteY1" fmla="*/ 770817 h 812322"/>
-                <a:gd name="connsiteX2" fmla="*/ 190078 w 718558"/>
-                <a:gd name="connsiteY2" fmla="*/ 64491 h 812322"/>
-                <a:gd name="connsiteX3" fmla="*/ 718558 w 718558"/>
-                <a:gd name="connsiteY3" fmla="*/ 0 h 812322"/>
-                <a:gd name="connsiteX0" fmla="*/ 641397 w 709409"/>
-                <a:gd name="connsiteY0" fmla="*/ 748145 h 812322"/>
-                <a:gd name="connsiteX1" fmla="*/ 14163 w 709409"/>
-                <a:gd name="connsiteY1" fmla="*/ 770817 h 812322"/>
-                <a:gd name="connsiteX2" fmla="*/ 180929 w 709409"/>
-                <a:gd name="connsiteY2" fmla="*/ 64491 h 812322"/>
-                <a:gd name="connsiteX3" fmla="*/ 709409 w 709409"/>
-                <a:gd name="connsiteY3" fmla="*/ 0 h 812322"/>
-                <a:gd name="connsiteX0" fmla="*/ 657796 w 725808"/>
-                <a:gd name="connsiteY0" fmla="*/ 748145 h 773366"/>
-                <a:gd name="connsiteX1" fmla="*/ 30562 w 725808"/>
-                <a:gd name="connsiteY1" fmla="*/ 770817 h 773366"/>
-                <a:gd name="connsiteX2" fmla="*/ 197328 w 725808"/>
-                <a:gd name="connsiteY2" fmla="*/ 64491 h 773366"/>
-                <a:gd name="connsiteX3" fmla="*/ 725808 w 725808"/>
-                <a:gd name="connsiteY3" fmla="*/ 0 h 773366"/>
-                <a:gd name="connsiteX0" fmla="*/ 627313 w 695325"/>
-                <a:gd name="connsiteY0" fmla="*/ 748145 h 770867"/>
-                <a:gd name="connsiteX1" fmla="*/ 79 w 695325"/>
-                <a:gd name="connsiteY1" fmla="*/ 770817 h 770867"/>
-                <a:gd name="connsiteX2" fmla="*/ 166845 w 695325"/>
-                <a:gd name="connsiteY2" fmla="*/ 64491 h 770867"/>
-                <a:gd name="connsiteX3" fmla="*/ 695325 w 695325"/>
-                <a:gd name="connsiteY3" fmla="*/ 0 h 770867"/>
-                <a:gd name="connsiteX0" fmla="*/ 647487 w 715499"/>
-                <a:gd name="connsiteY0" fmla="*/ 748145 h 770817"/>
-                <a:gd name="connsiteX1" fmla="*/ 20253 w 715499"/>
-                <a:gd name="connsiteY1" fmla="*/ 770817 h 770817"/>
-                <a:gd name="connsiteX2" fmla="*/ 156757 w 715499"/>
-                <a:gd name="connsiteY2" fmla="*/ 218064 h 770817"/>
-                <a:gd name="connsiteX3" fmla="*/ 187019 w 715499"/>
-                <a:gd name="connsiteY3" fmla="*/ 64491 h 770817"/>
-                <a:gd name="connsiteX4" fmla="*/ 715499 w 715499"/>
-                <a:gd name="connsiteY4" fmla="*/ 0 h 770817"/>
-                <a:gd name="connsiteX0" fmla="*/ 647487 w 715499"/>
-                <a:gd name="connsiteY0" fmla="*/ 748145 h 770817"/>
-                <a:gd name="connsiteX1" fmla="*/ 20253 w 715499"/>
-                <a:gd name="connsiteY1" fmla="*/ 770817 h 770817"/>
-                <a:gd name="connsiteX2" fmla="*/ 156757 w 715499"/>
-                <a:gd name="connsiteY2" fmla="*/ 218064 h 770817"/>
-                <a:gd name="connsiteX3" fmla="*/ 187019 w 715499"/>
-                <a:gd name="connsiteY3" fmla="*/ 64491 h 770817"/>
-                <a:gd name="connsiteX4" fmla="*/ 715499 w 715499"/>
-                <a:gd name="connsiteY4" fmla="*/ 0 h 770817"/>
-                <a:gd name="connsiteX0" fmla="*/ 650546 w 718558"/>
-                <a:gd name="connsiteY0" fmla="*/ 748145 h 812322"/>
-                <a:gd name="connsiteX1" fmla="*/ 23312 w 718558"/>
-                <a:gd name="connsiteY1" fmla="*/ 770817 h 812322"/>
-                <a:gd name="connsiteX2" fmla="*/ 190078 w 718558"/>
-                <a:gd name="connsiteY2" fmla="*/ 64491 h 812322"/>
-                <a:gd name="connsiteX3" fmla="*/ 718558 w 718558"/>
-                <a:gd name="connsiteY3" fmla="*/ 0 h 812322"/>
-                <a:gd name="connsiteX0" fmla="*/ 641987 w 709999"/>
-                <a:gd name="connsiteY0" fmla="*/ 748145 h 812322"/>
-                <a:gd name="connsiteX1" fmla="*/ 14753 w 709999"/>
-                <a:gd name="connsiteY1" fmla="*/ 770817 h 812322"/>
-                <a:gd name="connsiteX2" fmla="*/ 181519 w 709999"/>
-                <a:gd name="connsiteY2" fmla="*/ 64491 h 812322"/>
-                <a:gd name="connsiteX3" fmla="*/ 709999 w 709999"/>
-                <a:gd name="connsiteY3" fmla="*/ 0 h 812322"/>
-                <a:gd name="connsiteX0" fmla="*/ 641801 w 709813"/>
-                <a:gd name="connsiteY0" fmla="*/ 748145 h 772383"/>
-                <a:gd name="connsiteX1" fmla="*/ 14567 w 709813"/>
-                <a:gd name="connsiteY1" fmla="*/ 770817 h 772383"/>
-                <a:gd name="connsiteX2" fmla="*/ 181333 w 709813"/>
-                <a:gd name="connsiteY2" fmla="*/ 64491 h 772383"/>
-                <a:gd name="connsiteX3" fmla="*/ 709813 w 709813"/>
-                <a:gd name="connsiteY3" fmla="*/ 0 h 772383"/>
-                <a:gd name="connsiteX0" fmla="*/ 627328 w 695340"/>
-                <a:gd name="connsiteY0" fmla="*/ 748145 h 771993"/>
-                <a:gd name="connsiteX1" fmla="*/ 94 w 695340"/>
-                <a:gd name="connsiteY1" fmla="*/ 770817 h 771993"/>
-                <a:gd name="connsiteX2" fmla="*/ 166860 w 695340"/>
-                <a:gd name="connsiteY2" fmla="*/ 64491 h 771993"/>
-                <a:gd name="connsiteX3" fmla="*/ 695340 w 695340"/>
-                <a:gd name="connsiteY3" fmla="*/ 0 h 771993"/>
-                <a:gd name="connsiteX0" fmla="*/ 627277 w 695289"/>
-                <a:gd name="connsiteY0" fmla="*/ 748145 h 770819"/>
-                <a:gd name="connsiteX1" fmla="*/ 43 w 695289"/>
-                <a:gd name="connsiteY1" fmla="*/ 770817 h 770819"/>
-                <a:gd name="connsiteX2" fmla="*/ 166809 w 695289"/>
-                <a:gd name="connsiteY2" fmla="*/ 64491 h 770819"/>
-                <a:gd name="connsiteX3" fmla="*/ 695289 w 695289"/>
-                <a:gd name="connsiteY3" fmla="*/ 0 h 770819"/>
-                <a:gd name="connsiteX0" fmla="*/ 644267 w 712279"/>
-                <a:gd name="connsiteY0" fmla="*/ 748145 h 816007"/>
-                <a:gd name="connsiteX1" fmla="*/ 17033 w 712279"/>
-                <a:gd name="connsiteY1" fmla="*/ 770817 h 816007"/>
-                <a:gd name="connsiteX2" fmla="*/ 162367 w 712279"/>
-                <a:gd name="connsiteY2" fmla="*/ 13294 h 816007"/>
-                <a:gd name="connsiteX3" fmla="*/ 712279 w 712279"/>
-                <a:gd name="connsiteY3" fmla="*/ 0 h 816007"/>
-                <a:gd name="connsiteX0" fmla="*/ 630695 w 698707"/>
-                <a:gd name="connsiteY0" fmla="*/ 748145 h 771675"/>
-                <a:gd name="connsiteX1" fmla="*/ 3461 w 698707"/>
-                <a:gd name="connsiteY1" fmla="*/ 770817 h 771675"/>
-                <a:gd name="connsiteX2" fmla="*/ 148795 w 698707"/>
-                <a:gd name="connsiteY2" fmla="*/ 13294 h 771675"/>
-                <a:gd name="connsiteX3" fmla="*/ 698707 w 698707"/>
-                <a:gd name="connsiteY3" fmla="*/ 0 h 771675"/>
-                <a:gd name="connsiteX0" fmla="*/ 627301 w 695313"/>
-                <a:gd name="connsiteY0" fmla="*/ 748145 h 770838"/>
-                <a:gd name="connsiteX1" fmla="*/ 67 w 695313"/>
-                <a:gd name="connsiteY1" fmla="*/ 770817 h 770838"/>
-                <a:gd name="connsiteX2" fmla="*/ 145401 w 695313"/>
-                <a:gd name="connsiteY2" fmla="*/ 13294 h 770838"/>
-                <a:gd name="connsiteX3" fmla="*/ 695313 w 695313"/>
-                <a:gd name="connsiteY3" fmla="*/ 0 h 770838"/>
-                <a:gd name="connsiteX0" fmla="*/ 627301 w 695313"/>
-                <a:gd name="connsiteY0" fmla="*/ 748145 h 770838"/>
-                <a:gd name="connsiteX1" fmla="*/ 67 w 695313"/>
-                <a:gd name="connsiteY1" fmla="*/ 770817 h 770838"/>
-                <a:gd name="connsiteX2" fmla="*/ 145401 w 695313"/>
-                <a:gd name="connsiteY2" fmla="*/ 13294 h 770838"/>
-                <a:gd name="connsiteX3" fmla="*/ 695313 w 695313"/>
-                <a:gd name="connsiteY3" fmla="*/ 0 h 770838"/>
-                <a:gd name="connsiteX0" fmla="*/ 627301 w 695313"/>
-                <a:gd name="connsiteY0" fmla="*/ 748145 h 770838"/>
-                <a:gd name="connsiteX1" fmla="*/ 67 w 695313"/>
-                <a:gd name="connsiteY1" fmla="*/ 770817 h 770838"/>
-                <a:gd name="connsiteX2" fmla="*/ 145401 w 695313"/>
-                <a:gd name="connsiteY2" fmla="*/ 13294 h 770838"/>
-                <a:gd name="connsiteX3" fmla="*/ 695313 w 695313"/>
-                <a:gd name="connsiteY3" fmla="*/ 0 h 770838"/>
-                <a:gd name="connsiteX0" fmla="*/ 627301 w 695313"/>
-                <a:gd name="connsiteY0" fmla="*/ 748145 h 770838"/>
-                <a:gd name="connsiteX1" fmla="*/ 67 w 695313"/>
-                <a:gd name="connsiteY1" fmla="*/ 770817 h 770838"/>
-                <a:gd name="connsiteX2" fmla="*/ 145401 w 695313"/>
-                <a:gd name="connsiteY2" fmla="*/ 13294 h 770838"/>
-                <a:gd name="connsiteX3" fmla="*/ 695313 w 695313"/>
-                <a:gd name="connsiteY3" fmla="*/ 0 h 770838"/>
-                <a:gd name="connsiteX0" fmla="*/ 627301 w 695313"/>
-                <a:gd name="connsiteY0" fmla="*/ 748145 h 770838"/>
-                <a:gd name="connsiteX1" fmla="*/ 67 w 695313"/>
-                <a:gd name="connsiteY1" fmla="*/ 770817 h 770838"/>
-                <a:gd name="connsiteX2" fmla="*/ 145401 w 695313"/>
-                <a:gd name="connsiteY2" fmla="*/ 13294 h 770838"/>
-                <a:gd name="connsiteX3" fmla="*/ 695313 w 695313"/>
-                <a:gd name="connsiteY3" fmla="*/ 0 h 770838"/>
-                <a:gd name="connsiteX0" fmla="*/ 627301 w 695313"/>
-                <a:gd name="connsiteY0" fmla="*/ 748145 h 770838"/>
-                <a:gd name="connsiteX1" fmla="*/ 67 w 695313"/>
-                <a:gd name="connsiteY1" fmla="*/ 770817 h 770838"/>
-                <a:gd name="connsiteX2" fmla="*/ 145401 w 695313"/>
-                <a:gd name="connsiteY2" fmla="*/ 13294 h 770838"/>
-                <a:gd name="connsiteX3" fmla="*/ 695313 w 695313"/>
-                <a:gd name="connsiteY3" fmla="*/ 0 h 770838"/>
-                <a:gd name="connsiteX0" fmla="*/ 627355 w 695367"/>
-                <a:gd name="connsiteY0" fmla="*/ 748145 h 770856"/>
-                <a:gd name="connsiteX1" fmla="*/ 121 w 695367"/>
-                <a:gd name="connsiteY1" fmla="*/ 770817 h 770856"/>
-                <a:gd name="connsiteX2" fmla="*/ 145455 w 695367"/>
-                <a:gd name="connsiteY2" fmla="*/ 13294 h 770856"/>
-                <a:gd name="connsiteX3" fmla="*/ 695367 w 695367"/>
-                <a:gd name="connsiteY3" fmla="*/ 0 h 770856"/>
-                <a:gd name="connsiteX0" fmla="*/ 627355 w 695367"/>
-                <a:gd name="connsiteY0" fmla="*/ 748145 h 770856"/>
-                <a:gd name="connsiteX1" fmla="*/ 121 w 695367"/>
-                <a:gd name="connsiteY1" fmla="*/ 770817 h 770856"/>
-                <a:gd name="connsiteX2" fmla="*/ 145455 w 695367"/>
-                <a:gd name="connsiteY2" fmla="*/ 13294 h 770856"/>
-                <a:gd name="connsiteX3" fmla="*/ 695367 w 695367"/>
-                <a:gd name="connsiteY3" fmla="*/ 0 h 770856"/>
-                <a:gd name="connsiteX0" fmla="*/ 627235 w 695247"/>
-                <a:gd name="connsiteY0" fmla="*/ 748145 h 772339"/>
-                <a:gd name="connsiteX1" fmla="*/ 1 w 695247"/>
-                <a:gd name="connsiteY1" fmla="*/ 770817 h 772339"/>
-                <a:gd name="connsiteX2" fmla="*/ 145335 w 695247"/>
-                <a:gd name="connsiteY2" fmla="*/ 13294 h 772339"/>
-                <a:gd name="connsiteX3" fmla="*/ 695247 w 695247"/>
-                <a:gd name="connsiteY3" fmla="*/ 0 h 772339"/>
-                <a:gd name="connsiteX0" fmla="*/ 627235 w 695247"/>
-                <a:gd name="connsiteY0" fmla="*/ 748145 h 772339"/>
-                <a:gd name="connsiteX1" fmla="*/ 1 w 695247"/>
-                <a:gd name="connsiteY1" fmla="*/ 770817 h 772339"/>
-                <a:gd name="connsiteX2" fmla="*/ 145335 w 695247"/>
-                <a:gd name="connsiteY2" fmla="*/ 13294 h 772339"/>
-                <a:gd name="connsiteX3" fmla="*/ 695247 w 695247"/>
-                <a:gd name="connsiteY3" fmla="*/ 0 h 772339"/>
-                <a:gd name="connsiteX0" fmla="*/ 627234 w 695246"/>
-                <a:gd name="connsiteY0" fmla="*/ 748145 h 770817"/>
-                <a:gd name="connsiteX1" fmla="*/ 0 w 695246"/>
-                <a:gd name="connsiteY1" fmla="*/ 770817 h 770817"/>
-                <a:gd name="connsiteX2" fmla="*/ 145334 w 695246"/>
-                <a:gd name="connsiteY2" fmla="*/ 13294 h 770817"/>
-                <a:gd name="connsiteX3" fmla="*/ 695246 w 695246"/>
-                <a:gd name="connsiteY3" fmla="*/ 0 h 770817"/>
-                <a:gd name="connsiteX0" fmla="*/ 627234 w 695246"/>
-                <a:gd name="connsiteY0" fmla="*/ 748145 h 770817"/>
-                <a:gd name="connsiteX1" fmla="*/ 0 w 695246"/>
-                <a:gd name="connsiteY1" fmla="*/ 770817 h 770817"/>
-                <a:gd name="connsiteX2" fmla="*/ 145334 w 695246"/>
-                <a:gd name="connsiteY2" fmla="*/ 13294 h 770817"/>
-                <a:gd name="connsiteX3" fmla="*/ 695246 w 695246"/>
-                <a:gd name="connsiteY3" fmla="*/ 0 h 770817"/>
-                <a:gd name="connsiteX0" fmla="*/ 627234 w 695246"/>
-                <a:gd name="connsiteY0" fmla="*/ 748145 h 770817"/>
-                <a:gd name="connsiteX1" fmla="*/ 0 w 695246"/>
-                <a:gd name="connsiteY1" fmla="*/ 770817 h 770817"/>
-                <a:gd name="connsiteX2" fmla="*/ 145334 w 695246"/>
-                <a:gd name="connsiteY2" fmla="*/ 13294 h 770817"/>
-                <a:gd name="connsiteX3" fmla="*/ 695246 w 695246"/>
-                <a:gd name="connsiteY3" fmla="*/ 0 h 770817"/>
-                <a:gd name="connsiteX0" fmla="*/ 486740 w 554752"/>
-                <a:gd name="connsiteY0" fmla="*/ 748145 h 748195"/>
-                <a:gd name="connsiteX1" fmla="*/ 0 w 554752"/>
-                <a:gd name="connsiteY1" fmla="*/ 748195 h 748195"/>
-                <a:gd name="connsiteX2" fmla="*/ 4840 w 554752"/>
-                <a:gd name="connsiteY2" fmla="*/ 13294 h 748195"/>
-                <a:gd name="connsiteX3" fmla="*/ 554752 w 554752"/>
-                <a:gd name="connsiteY3" fmla="*/ 0 h 748195"/>
-                <a:gd name="connsiteX0" fmla="*/ 484359 w 552371"/>
-                <a:gd name="connsiteY0" fmla="*/ 748145 h 820823"/>
-                <a:gd name="connsiteX1" fmla="*/ 0 w 552371"/>
-                <a:gd name="connsiteY1" fmla="*/ 820823 h 820823"/>
-                <a:gd name="connsiteX2" fmla="*/ 2459 w 552371"/>
-                <a:gd name="connsiteY2" fmla="*/ 13294 h 820823"/>
-                <a:gd name="connsiteX3" fmla="*/ 552371 w 552371"/>
-                <a:gd name="connsiteY3" fmla="*/ 0 h 820823"/>
-                <a:gd name="connsiteX0" fmla="*/ 484359 w 552371"/>
-                <a:gd name="connsiteY0" fmla="*/ 748145 h 881293"/>
-                <a:gd name="connsiteX1" fmla="*/ 486546 w 552371"/>
-                <a:gd name="connsiteY1" fmla="*/ 831236 h 881293"/>
-                <a:gd name="connsiteX2" fmla="*/ 0 w 552371"/>
-                <a:gd name="connsiteY2" fmla="*/ 820823 h 881293"/>
-                <a:gd name="connsiteX3" fmla="*/ 2459 w 552371"/>
-                <a:gd name="connsiteY3" fmla="*/ 13294 h 881293"/>
-                <a:gd name="connsiteX4" fmla="*/ 552371 w 552371"/>
-                <a:gd name="connsiteY4" fmla="*/ 0 h 881293"/>
-                <a:gd name="connsiteX0" fmla="*/ 486546 w 552371"/>
-                <a:gd name="connsiteY0" fmla="*/ 831236 h 881293"/>
-                <a:gd name="connsiteX1" fmla="*/ 0 w 552371"/>
-                <a:gd name="connsiteY1" fmla="*/ 820823 h 881293"/>
-                <a:gd name="connsiteX2" fmla="*/ 2459 w 552371"/>
-                <a:gd name="connsiteY2" fmla="*/ 13294 h 881293"/>
-                <a:gd name="connsiteX3" fmla="*/ 552371 w 552371"/>
-                <a:gd name="connsiteY3" fmla="*/ 0 h 881293"/>
-                <a:gd name="connsiteX0" fmla="*/ 505596 w 552371"/>
-                <a:gd name="connsiteY0" fmla="*/ 866954 h 894719"/>
-                <a:gd name="connsiteX1" fmla="*/ 0 w 552371"/>
-                <a:gd name="connsiteY1" fmla="*/ 820823 h 894719"/>
-                <a:gd name="connsiteX2" fmla="*/ 2459 w 552371"/>
-                <a:gd name="connsiteY2" fmla="*/ 13294 h 894719"/>
-                <a:gd name="connsiteX3" fmla="*/ 552371 w 552371"/>
-                <a:gd name="connsiteY3" fmla="*/ 0 h 894719"/>
-                <a:gd name="connsiteX0" fmla="*/ 594893 w 594893"/>
-                <a:gd name="connsiteY0" fmla="*/ 1087220 h 1087885"/>
-                <a:gd name="connsiteX1" fmla="*/ 0 w 594893"/>
-                <a:gd name="connsiteY1" fmla="*/ 820823 h 1087885"/>
-                <a:gd name="connsiteX2" fmla="*/ 2459 w 594893"/>
-                <a:gd name="connsiteY2" fmla="*/ 13294 h 1087885"/>
-                <a:gd name="connsiteX3" fmla="*/ 552371 w 594893"/>
-                <a:gd name="connsiteY3" fmla="*/ 0 h 1087885"/>
-                <a:gd name="connsiteX0" fmla="*/ 593694 w 593694"/>
-                <a:gd name="connsiteY0" fmla="*/ 1087220 h 1139755"/>
-                <a:gd name="connsiteX1" fmla="*/ 9517 w 593694"/>
-                <a:gd name="connsiteY1" fmla="*/ 1080379 h 1139755"/>
-                <a:gd name="connsiteX2" fmla="*/ 1260 w 593694"/>
-                <a:gd name="connsiteY2" fmla="*/ 13294 h 1139755"/>
-                <a:gd name="connsiteX3" fmla="*/ 551172 w 593694"/>
-                <a:gd name="connsiteY3" fmla="*/ 0 h 1139755"/>
-                <a:gd name="connsiteX0" fmla="*/ 593694 w 593694"/>
-                <a:gd name="connsiteY0" fmla="*/ 1087220 h 1092028"/>
-                <a:gd name="connsiteX1" fmla="*/ 9517 w 593694"/>
-                <a:gd name="connsiteY1" fmla="*/ 1080379 h 1092028"/>
-                <a:gd name="connsiteX2" fmla="*/ 1260 w 593694"/>
-                <a:gd name="connsiteY2" fmla="*/ 13294 h 1092028"/>
-                <a:gd name="connsiteX3" fmla="*/ 551172 w 593694"/>
-                <a:gd name="connsiteY3" fmla="*/ 0 h 1092028"/>
-                <a:gd name="connsiteX0" fmla="*/ 593694 w 593694"/>
-                <a:gd name="connsiteY0" fmla="*/ 1087220 h 1099405"/>
-                <a:gd name="connsiteX1" fmla="*/ 9517 w 593694"/>
-                <a:gd name="connsiteY1" fmla="*/ 1097048 h 1099405"/>
-                <a:gd name="connsiteX2" fmla="*/ 1260 w 593694"/>
-                <a:gd name="connsiteY2" fmla="*/ 13294 h 1099405"/>
-                <a:gd name="connsiteX3" fmla="*/ 551172 w 593694"/>
-                <a:gd name="connsiteY3" fmla="*/ 0 h 1099405"/>
-                <a:gd name="connsiteX0" fmla="*/ 593694 w 593694"/>
-                <a:gd name="connsiteY0" fmla="*/ 1087220 h 1098408"/>
-                <a:gd name="connsiteX1" fmla="*/ 9517 w 593694"/>
-                <a:gd name="connsiteY1" fmla="*/ 1097048 h 1098408"/>
-                <a:gd name="connsiteX2" fmla="*/ 1260 w 593694"/>
-                <a:gd name="connsiteY2" fmla="*/ 13294 h 1098408"/>
-                <a:gd name="connsiteX3" fmla="*/ 551172 w 593694"/>
-                <a:gd name="connsiteY3" fmla="*/ 0 h 1098408"/>
-                <a:gd name="connsiteX0" fmla="*/ 591313 w 591313"/>
-                <a:gd name="connsiteY0" fmla="*/ 1095554 h 1100106"/>
-                <a:gd name="connsiteX1" fmla="*/ 9517 w 591313"/>
-                <a:gd name="connsiteY1" fmla="*/ 1097048 h 1100106"/>
-                <a:gd name="connsiteX2" fmla="*/ 1260 w 591313"/>
-                <a:gd name="connsiteY2" fmla="*/ 13294 h 1100106"/>
-                <a:gd name="connsiteX3" fmla="*/ 551172 w 591313"/>
-                <a:gd name="connsiteY3" fmla="*/ 0 h 1100106"/>
-                <a:gd name="connsiteX0" fmla="*/ 591313 w 591313"/>
-                <a:gd name="connsiteY0" fmla="*/ 1095554 h 1099753"/>
-                <a:gd name="connsiteX1" fmla="*/ 9517 w 591313"/>
-                <a:gd name="connsiteY1" fmla="*/ 1097048 h 1099753"/>
-                <a:gd name="connsiteX2" fmla="*/ 1260 w 591313"/>
-                <a:gd name="connsiteY2" fmla="*/ 13294 h 1099753"/>
-                <a:gd name="connsiteX3" fmla="*/ 551172 w 591313"/>
-                <a:gd name="connsiteY3" fmla="*/ 0 h 1099753"/>
-                <a:gd name="connsiteX0" fmla="*/ 591313 w 591313"/>
-                <a:gd name="connsiteY0" fmla="*/ 1095554 h 1099753"/>
-                <a:gd name="connsiteX1" fmla="*/ 9517 w 591313"/>
-                <a:gd name="connsiteY1" fmla="*/ 1097048 h 1099753"/>
-                <a:gd name="connsiteX2" fmla="*/ 1260 w 591313"/>
-                <a:gd name="connsiteY2" fmla="*/ 13294 h 1099753"/>
-                <a:gd name="connsiteX3" fmla="*/ 551172 w 591313"/>
-                <a:gd name="connsiteY3" fmla="*/ 0 h 1099753"/>
-                <a:gd name="connsiteX0" fmla="*/ 591313 w 591313"/>
-                <a:gd name="connsiteY0" fmla="*/ 1082260 h 1086459"/>
-                <a:gd name="connsiteX1" fmla="*/ 9517 w 591313"/>
-                <a:gd name="connsiteY1" fmla="*/ 1083754 h 1086459"/>
-                <a:gd name="connsiteX2" fmla="*/ 1260 w 591313"/>
-                <a:gd name="connsiteY2" fmla="*/ 0 h 1086459"/>
-                <a:gd name="connsiteX3" fmla="*/ 551172 w 591313"/>
-                <a:gd name="connsiteY3" fmla="*/ 994 h 1086459"/>
-                <a:gd name="connsiteX0" fmla="*/ 586870 w 586870"/>
-                <a:gd name="connsiteY0" fmla="*/ 1081266 h 1085465"/>
-                <a:gd name="connsiteX1" fmla="*/ 5074 w 586870"/>
-                <a:gd name="connsiteY1" fmla="*/ 1082760 h 1085465"/>
-                <a:gd name="connsiteX2" fmla="*/ 1579 w 586870"/>
-                <a:gd name="connsiteY2" fmla="*/ 15674 h 1085465"/>
-                <a:gd name="connsiteX3" fmla="*/ 546729 w 586870"/>
-                <a:gd name="connsiteY3" fmla="*/ 0 h 1085465"/>
-                <a:gd name="connsiteX0" fmla="*/ 590188 w 590188"/>
-                <a:gd name="connsiteY0" fmla="*/ 1081266 h 1085465"/>
-                <a:gd name="connsiteX1" fmla="*/ 8392 w 590188"/>
-                <a:gd name="connsiteY1" fmla="*/ 1082760 h 1085465"/>
-                <a:gd name="connsiteX2" fmla="*/ 1326 w 590188"/>
-                <a:gd name="connsiteY2" fmla="*/ 10911 h 1085465"/>
-                <a:gd name="connsiteX3" fmla="*/ 550047 w 590188"/>
-                <a:gd name="connsiteY3" fmla="*/ 0 h 1085465"/>
-                <a:gd name="connsiteX0" fmla="*/ 592442 w 592442"/>
-                <a:gd name="connsiteY0" fmla="*/ 1081266 h 1085465"/>
-                <a:gd name="connsiteX1" fmla="*/ 10646 w 592442"/>
-                <a:gd name="connsiteY1" fmla="*/ 1082760 h 1085465"/>
-                <a:gd name="connsiteX2" fmla="*/ 1199 w 592442"/>
-                <a:gd name="connsiteY2" fmla="*/ 2577 h 1085465"/>
-                <a:gd name="connsiteX3" fmla="*/ 552301 w 592442"/>
-                <a:gd name="connsiteY3" fmla="*/ 0 h 1085465"/>
-                <a:gd name="connsiteX0" fmla="*/ 591351 w 591351"/>
-                <a:gd name="connsiteY0" fmla="*/ 1081266 h 1085465"/>
-                <a:gd name="connsiteX1" fmla="*/ 9555 w 591351"/>
-                <a:gd name="connsiteY1" fmla="*/ 1082760 h 1085465"/>
-                <a:gd name="connsiteX2" fmla="*/ 108 w 591351"/>
-                <a:gd name="connsiteY2" fmla="*/ 2577 h 1085465"/>
-                <a:gd name="connsiteX3" fmla="*/ 551210 w 591351"/>
-                <a:gd name="connsiteY3" fmla="*/ 0 h 1085465"/>
-                <a:gd name="connsiteX0" fmla="*/ 591405 w 591405"/>
-                <a:gd name="connsiteY0" fmla="*/ 1081266 h 1085465"/>
-                <a:gd name="connsiteX1" fmla="*/ 9609 w 591405"/>
-                <a:gd name="connsiteY1" fmla="*/ 1082760 h 1085465"/>
-                <a:gd name="connsiteX2" fmla="*/ 162 w 591405"/>
-                <a:gd name="connsiteY2" fmla="*/ 2577 h 1085465"/>
-                <a:gd name="connsiteX3" fmla="*/ 551264 w 591405"/>
-                <a:gd name="connsiteY3" fmla="*/ 0 h 1085465"/>
-                <a:gd name="connsiteX0" fmla="*/ 591405 w 591405"/>
-                <a:gd name="connsiteY0" fmla="*/ 1081266 h 1084480"/>
-                <a:gd name="connsiteX1" fmla="*/ 9609 w 591405"/>
-                <a:gd name="connsiteY1" fmla="*/ 1082760 h 1084480"/>
-                <a:gd name="connsiteX2" fmla="*/ 162 w 591405"/>
-                <a:gd name="connsiteY2" fmla="*/ 2577 h 1084480"/>
-                <a:gd name="connsiteX3" fmla="*/ 551264 w 591405"/>
-                <a:gd name="connsiteY3" fmla="*/ 0 h 1084480"/>
-                <a:gd name="connsiteX0" fmla="*/ 586642 w 586642"/>
-                <a:gd name="connsiteY0" fmla="*/ 1081266 h 1084480"/>
-                <a:gd name="connsiteX1" fmla="*/ 9609 w 586642"/>
-                <a:gd name="connsiteY1" fmla="*/ 1082760 h 1084480"/>
-                <a:gd name="connsiteX2" fmla="*/ 162 w 586642"/>
-                <a:gd name="connsiteY2" fmla="*/ 2577 h 1084480"/>
-                <a:gd name="connsiteX3" fmla="*/ 551264 w 586642"/>
-                <a:gd name="connsiteY3" fmla="*/ 0 h 1084480"/>
-                <a:gd name="connsiteX0" fmla="*/ 587818 w 587818"/>
-                <a:gd name="connsiteY0" fmla="*/ 1089405 h 1092619"/>
-                <a:gd name="connsiteX1" fmla="*/ 10785 w 587818"/>
-                <a:gd name="connsiteY1" fmla="*/ 1090899 h 1092619"/>
-                <a:gd name="connsiteX2" fmla="*/ 147 w 587818"/>
-                <a:gd name="connsiteY2" fmla="*/ 0 h 1092619"/>
-                <a:gd name="connsiteX3" fmla="*/ 552440 w 587818"/>
-                <a:gd name="connsiteY3" fmla="*/ 8139 h 1092619"/>
-                <a:gd name="connsiteX0" fmla="*/ 587818 w 587818"/>
-                <a:gd name="connsiteY0" fmla="*/ 1081266 h 1084480"/>
-                <a:gd name="connsiteX1" fmla="*/ 10785 w 587818"/>
-                <a:gd name="connsiteY1" fmla="*/ 1082760 h 1084480"/>
-                <a:gd name="connsiteX2" fmla="*/ 147 w 587818"/>
-                <a:gd name="connsiteY2" fmla="*/ 196 h 1084480"/>
-                <a:gd name="connsiteX3" fmla="*/ 552440 w 587818"/>
-                <a:gd name="connsiteY3" fmla="*/ 0 h 1084480"/>
-                <a:gd name="connsiteX0" fmla="*/ 591416 w 591416"/>
-                <a:gd name="connsiteY0" fmla="*/ 1081266 h 1084480"/>
-                <a:gd name="connsiteX1" fmla="*/ 96 w 591416"/>
-                <a:gd name="connsiteY1" fmla="*/ 1082760 h 1084480"/>
-                <a:gd name="connsiteX2" fmla="*/ 3745 w 591416"/>
-                <a:gd name="connsiteY2" fmla="*/ 196 h 1084480"/>
-                <a:gd name="connsiteX3" fmla="*/ 556038 w 591416"/>
-                <a:gd name="connsiteY3" fmla="*/ 0 h 1084480"/>
-                <a:gd name="connsiteX0" fmla="*/ 591416 w 591416"/>
-                <a:gd name="connsiteY0" fmla="*/ 1081266 h 1084480"/>
-                <a:gd name="connsiteX1" fmla="*/ 96 w 591416"/>
-                <a:gd name="connsiteY1" fmla="*/ 1082760 h 1084480"/>
-                <a:gd name="connsiteX2" fmla="*/ 3745 w 591416"/>
-                <a:gd name="connsiteY2" fmla="*/ 196 h 1084480"/>
-                <a:gd name="connsiteX3" fmla="*/ 556038 w 591416"/>
-                <a:gd name="connsiteY3" fmla="*/ 0 h 1084480"/>
-                <a:gd name="connsiteX0" fmla="*/ 591416 w 591416"/>
-                <a:gd name="connsiteY0" fmla="*/ 1081266 h 1082760"/>
-                <a:gd name="connsiteX1" fmla="*/ 96 w 591416"/>
-                <a:gd name="connsiteY1" fmla="*/ 1082760 h 1082760"/>
-                <a:gd name="connsiteX2" fmla="*/ 3745 w 591416"/>
-                <a:gd name="connsiteY2" fmla="*/ 196 h 1082760"/>
-                <a:gd name="connsiteX3" fmla="*/ 556038 w 591416"/>
-                <a:gd name="connsiteY3" fmla="*/ 0 h 1082760"/>
-                <a:gd name="connsiteX0" fmla="*/ 588565 w 588565"/>
-                <a:gd name="connsiteY0" fmla="*/ 1081266 h 1081266"/>
-                <a:gd name="connsiteX1" fmla="*/ 817 w 588565"/>
-                <a:gd name="connsiteY1" fmla="*/ 1077998 h 1081266"/>
-                <a:gd name="connsiteX2" fmla="*/ 894 w 588565"/>
-                <a:gd name="connsiteY2" fmla="*/ 196 h 1081266"/>
-                <a:gd name="connsiteX3" fmla="*/ 553187 w 588565"/>
-                <a:gd name="connsiteY3" fmla="*/ 0 h 1081266"/>
-                <a:gd name="connsiteX0" fmla="*/ 588099 w 588099"/>
-                <a:gd name="connsiteY0" fmla="*/ 1081266 h 1081570"/>
-                <a:gd name="connsiteX1" fmla="*/ 2732 w 588099"/>
-                <a:gd name="connsiteY1" fmla="*/ 1081570 h 1081570"/>
-                <a:gd name="connsiteX2" fmla="*/ 428 w 588099"/>
-                <a:gd name="connsiteY2" fmla="*/ 196 h 1081570"/>
-                <a:gd name="connsiteX3" fmla="*/ 552721 w 588099"/>
-                <a:gd name="connsiteY3" fmla="*/ 0 h 1081570"/>
-              </a:gdLst>
-              <a:ahLst/>
-              <a:cxnLst>
-                <a:cxn ang="0">
-                  <a:pos x="connsiteX0" y="connsiteY0"/>
-                </a:cxn>
-                <a:cxn ang="0">
-                  <a:pos x="connsiteX1" y="connsiteY1"/>
-                </a:cxn>
-                <a:cxn ang="0">
-                  <a:pos x="connsiteX2" y="connsiteY2"/>
-                </a:cxn>
-                <a:cxn ang="0">
-                  <a:pos x="connsiteX3" y="connsiteY3"/>
-                </a:cxn>
-              </a:cxnLst>
-              <a:rect l="l" t="t" r="r" b="b"/>
-              <a:pathLst>
-                <a:path w="588099" h="1081570">
-                  <a:moveTo>
-                    <a:pt x="588099" y="1081266"/>
-                  </a:moveTo>
-                  <a:lnTo>
-                    <a:pt x="2732" y="1081570"/>
-                  </a:lnTo>
-                  <a:cubicBezTo>
-                    <a:pt x="2090" y="977592"/>
-                    <a:pt x="-1146" y="267969"/>
-                    <a:pt x="428" y="196"/>
-                  </a:cubicBezTo>
-                  <a:lnTo>
-                    <a:pt x="552721" y="0"/>
-                  </a:lnTo>
-                </a:path>
-              </a:pathLst>
-            </a:custGeom>
-            <a:noFill/>
-            <a:ln w="12700">
-              <a:solidFill>
-                <a:schemeClr val="accent6">
-                  <a:lumMod val="75000"/>
-                </a:schemeClr>
-              </a:solidFill>
-              <a:tailEnd type="triangle" w="sm" len="sm"/>
-            </a:ln>
-          </p:spPr>
-          <p:style>
-            <a:lnRef idx="2">
-              <a:schemeClr val="accent1">
-                <a:shade val="50000"/>
-              </a:schemeClr>
-            </a:lnRef>
-            <a:fillRef idx="1">
-              <a:schemeClr val="accent1"/>
-            </a:fillRef>
-            <a:effectRef idx="0">
-              <a:schemeClr val="accent1"/>
-            </a:effectRef>
-            <a:fontRef idx="minor">
-              <a:schemeClr val="lt1"/>
-            </a:fontRef>
-          </p:style>
-          <p:txBody>
-            <a:bodyPr rtlCol="0" anchor="ctr"/>
-            <a:lstStyle/>
-            <a:p>
-              <a:pPr algn="ctr"/>
-              <a:endParaRPr lang="en-US"/>
-            </a:p>
-          </p:txBody>
-        </p:sp>
-      </p:grpSp>
-    </p:spTree>
-    <p:extLst>
-      <p:ext uri="{BB962C8B-B14F-4D97-AF65-F5344CB8AC3E}">
-        <p14:creationId xmlns:p14="http://schemas.microsoft.com/office/powerpoint/2010/main" val="4111534740"/>
-      </p:ext>
-    </p:extLst>
-  </p:cSld>
-  <p:clrMapOvr>
-    <a:masterClrMapping/>
-  </p:clrMapOvr>
-  <p:timing>
-    <p:tnLst>
-      <p:par>
-        <p:cTn id="1" dur="indefinite" restart="never" nodeType="tmRoot"/>
-      </p:par>
-    </p:tnLst>
-  </p:timing>
-</p:sld>
-</file>
-
 <file path=ppt/theme/theme1.xml><?xml version="1.0" encoding="utf-8"?>
 <a:theme xmlns:a="http://schemas.openxmlformats.org/drawingml/2006/main" name="Office Theme">
   <a:themeElements>

</xml_diff>